<commit_message>
Added explainer for fls classifiers
</commit_message>
<xml_diff>
--- a/images/draw_graphs.pptx
+++ b/images/draw_graphs.pptx
@@ -10,6 +10,16 @@
     <p:sldId id="257" r:id="rId4"/>
     <p:sldId id="263" r:id="rId5"/>
     <p:sldId id="264" r:id="rId6"/>
+    <p:sldId id="270" r:id="rId7"/>
+    <p:sldId id="271" r:id="rId8"/>
+    <p:sldId id="267" r:id="rId9"/>
+    <p:sldId id="268" r:id="rId10"/>
+    <p:sldId id="269" r:id="rId11"/>
+    <p:sldId id="272" r:id="rId12"/>
+    <p:sldId id="273" r:id="rId13"/>
+    <p:sldId id="274" r:id="rId14"/>
+    <p:sldId id="276" r:id="rId15"/>
+    <p:sldId id="275" r:id="rId16"/>
   </p:sldIdLst>
   <p:sldSz cx="12192000" cy="6858000"/>
   <p:notesSz cx="6858000" cy="9144000"/>
@@ -276,7 +286,7 @@
           <a:p>
             <a:fld id="{718E323C-DBA5-4272-AACA-840E2D89880F}" type="datetimeFigureOut">
               <a:rPr lang="en-GB" smtClean="0"/>
-              <a:t>21/12/2023</a:t>
+              <a:t>28/12/2023</a:t>
             </a:fld>
             <a:endParaRPr lang="en-GB"/>
           </a:p>
@@ -476,7 +486,7 @@
           <a:p>
             <a:fld id="{718E323C-DBA5-4272-AACA-840E2D89880F}" type="datetimeFigureOut">
               <a:rPr lang="en-GB" smtClean="0"/>
-              <a:t>21/12/2023</a:t>
+              <a:t>28/12/2023</a:t>
             </a:fld>
             <a:endParaRPr lang="en-GB"/>
           </a:p>
@@ -584,7 +594,7 @@
         </p:nvSpPr>
         <p:spPr>
           <a:xfrm>
-            <a:off x="8724900" y="365125"/>
+            <a:off x="8724899" y="365125"/>
             <a:ext cx="2628900" cy="5811838"/>
           </a:xfrm>
         </p:spPr>
@@ -618,7 +628,7 @@
         </p:nvSpPr>
         <p:spPr>
           <a:xfrm>
-            <a:off x="838200" y="365125"/>
+            <a:off x="838199" y="365125"/>
             <a:ext cx="7734300" cy="5811838"/>
           </a:xfrm>
         </p:spPr>
@@ -686,7 +696,7 @@
           <a:p>
             <a:fld id="{718E323C-DBA5-4272-AACA-840E2D89880F}" type="datetimeFigureOut">
               <a:rPr lang="en-GB" smtClean="0"/>
-              <a:t>21/12/2023</a:t>
+              <a:t>28/12/2023</a:t>
             </a:fld>
             <a:endParaRPr lang="en-GB"/>
           </a:p>
@@ -886,7 +896,7 @@
           <a:p>
             <a:fld id="{718E323C-DBA5-4272-AACA-840E2D89880F}" type="datetimeFigureOut">
               <a:rPr lang="en-GB" smtClean="0"/>
-              <a:t>21/12/2023</a:t>
+              <a:t>28/12/2023</a:t>
             </a:fld>
             <a:endParaRPr lang="en-GB"/>
           </a:p>
@@ -994,7 +1004,7 @@
         </p:nvSpPr>
         <p:spPr>
           <a:xfrm>
-            <a:off x="831850" y="1709740"/>
+            <a:off x="831852" y="1709741"/>
             <a:ext cx="10515600" cy="2852737"/>
           </a:xfrm>
         </p:spPr>
@@ -1032,7 +1042,7 @@
         </p:nvSpPr>
         <p:spPr>
           <a:xfrm>
-            <a:off x="831850" y="4589465"/>
+            <a:off x="831852" y="4589466"/>
             <a:ext cx="10515600" cy="1500187"/>
           </a:xfrm>
         </p:spPr>
@@ -1162,7 +1172,7 @@
           <a:p>
             <a:fld id="{718E323C-DBA5-4272-AACA-840E2D89880F}" type="datetimeFigureOut">
               <a:rPr lang="en-GB" smtClean="0"/>
-              <a:t>21/12/2023</a:t>
+              <a:t>28/12/2023</a:t>
             </a:fld>
             <a:endParaRPr lang="en-GB"/>
           </a:p>
@@ -1430,7 +1440,7 @@
           <a:p>
             <a:fld id="{718E323C-DBA5-4272-AACA-840E2D89880F}" type="datetimeFigureOut">
               <a:rPr lang="en-GB" smtClean="0"/>
-              <a:t>21/12/2023</a:t>
+              <a:t>28/12/2023</a:t>
             </a:fld>
             <a:endParaRPr lang="en-GB"/>
           </a:p>
@@ -1538,7 +1548,7 @@
         </p:nvSpPr>
         <p:spPr>
           <a:xfrm>
-            <a:off x="839789" y="365127"/>
+            <a:off x="839789" y="365128"/>
             <a:ext cx="10515600" cy="1325563"/>
           </a:xfrm>
         </p:spPr>
@@ -1572,7 +1582,7 @@
         </p:nvSpPr>
         <p:spPr>
           <a:xfrm>
-            <a:off x="839788" y="1681163"/>
+            <a:off x="839789" y="1681163"/>
             <a:ext cx="5157787" cy="823912"/>
           </a:xfrm>
         </p:spPr>
@@ -1643,7 +1653,7 @@
         </p:nvSpPr>
         <p:spPr>
           <a:xfrm>
-            <a:off x="839788" y="2505075"/>
+            <a:off x="839789" y="2505076"/>
             <a:ext cx="5157787" cy="3684588"/>
           </a:xfrm>
         </p:spPr>
@@ -1706,7 +1716,7 @@
         </p:nvSpPr>
         <p:spPr>
           <a:xfrm>
-            <a:off x="6172200" y="1681163"/>
+            <a:off x="6172202" y="1681163"/>
             <a:ext cx="5183188" cy="823912"/>
           </a:xfrm>
         </p:spPr>
@@ -1777,7 +1787,7 @@
         </p:nvSpPr>
         <p:spPr>
           <a:xfrm>
-            <a:off x="6172200" y="2505075"/>
+            <a:off x="6172202" y="2505076"/>
             <a:ext cx="5183188" cy="3684588"/>
           </a:xfrm>
         </p:spPr>
@@ -1845,7 +1855,7 @@
           <a:p>
             <a:fld id="{718E323C-DBA5-4272-AACA-840E2D89880F}" type="datetimeFigureOut">
               <a:rPr lang="en-GB" smtClean="0"/>
-              <a:t>21/12/2023</a:t>
+              <a:t>28/12/2023</a:t>
             </a:fld>
             <a:endParaRPr lang="en-GB"/>
           </a:p>
@@ -1987,7 +1997,7 @@
           <a:p>
             <a:fld id="{718E323C-DBA5-4272-AACA-840E2D89880F}" type="datetimeFigureOut">
               <a:rPr lang="en-GB" smtClean="0"/>
-              <a:t>21/12/2023</a:t>
+              <a:t>28/12/2023</a:t>
             </a:fld>
             <a:endParaRPr lang="en-GB"/>
           </a:p>
@@ -2100,7 +2110,7 @@
           <a:p>
             <a:fld id="{718E323C-DBA5-4272-AACA-840E2D89880F}" type="datetimeFigureOut">
               <a:rPr lang="en-GB" smtClean="0"/>
-              <a:t>21/12/2023</a:t>
+              <a:t>28/12/2023</a:t>
             </a:fld>
             <a:endParaRPr lang="en-GB"/>
           </a:p>
@@ -2246,7 +2256,7 @@
         </p:nvSpPr>
         <p:spPr>
           <a:xfrm>
-            <a:off x="5183188" y="987427"/>
+            <a:off x="5183190" y="987428"/>
             <a:ext cx="6172201" cy="4873625"/>
           </a:xfrm>
         </p:spPr>
@@ -2413,7 +2423,7 @@
           <a:p>
             <a:fld id="{718E323C-DBA5-4272-AACA-840E2D89880F}" type="datetimeFigureOut">
               <a:rPr lang="en-GB" smtClean="0"/>
-              <a:t>21/12/2023</a:t>
+              <a:t>28/12/2023</a:t>
             </a:fld>
             <a:endParaRPr lang="en-GB"/>
           </a:p>
@@ -2559,7 +2569,7 @@
         </p:nvSpPr>
         <p:spPr>
           <a:xfrm>
-            <a:off x="5183188" y="987427"/>
+            <a:off x="5183190" y="987428"/>
             <a:ext cx="6172201" cy="4873625"/>
           </a:xfrm>
         </p:spPr>
@@ -2702,7 +2712,7 @@
           <a:p>
             <a:fld id="{718E323C-DBA5-4272-AACA-840E2D89880F}" type="datetimeFigureOut">
               <a:rPr lang="en-GB" smtClean="0"/>
-              <a:t>21/12/2023</a:t>
+              <a:t>28/12/2023</a:t>
             </a:fld>
             <a:endParaRPr lang="en-GB"/>
           </a:p>
@@ -2815,7 +2825,7 @@
         </p:nvSpPr>
         <p:spPr>
           <a:xfrm>
-            <a:off x="838201" y="365127"/>
+            <a:off x="838202" y="365128"/>
             <a:ext cx="10515600" cy="1325563"/>
           </a:xfrm>
           <a:prstGeom prst="rect">
@@ -2854,7 +2864,7 @@
         </p:nvSpPr>
         <p:spPr>
           <a:xfrm>
-            <a:off x="838201" y="1825625"/>
+            <a:off x="838202" y="1825625"/>
             <a:ext cx="10515600" cy="4351338"/>
           </a:xfrm>
           <a:prstGeom prst="rect">
@@ -2922,7 +2932,7 @@
         </p:nvSpPr>
         <p:spPr>
           <a:xfrm>
-            <a:off x="838201" y="6356352"/>
+            <a:off x="838201" y="6356353"/>
             <a:ext cx="2743200" cy="365125"/>
           </a:xfrm>
           <a:prstGeom prst="rect">
@@ -2945,7 +2955,7 @@
           <a:p>
             <a:fld id="{718E323C-DBA5-4272-AACA-840E2D89880F}" type="datetimeFigureOut">
               <a:rPr lang="en-GB" smtClean="0"/>
-              <a:t>21/12/2023</a:t>
+              <a:t>28/12/2023</a:t>
             </a:fld>
             <a:endParaRPr lang="en-GB"/>
           </a:p>
@@ -2969,7 +2979,7 @@
         </p:nvSpPr>
         <p:spPr>
           <a:xfrm>
-            <a:off x="4038601" y="6356352"/>
+            <a:off x="4038602" y="6356353"/>
             <a:ext cx="4114800" cy="365125"/>
           </a:xfrm>
           <a:prstGeom prst="rect">
@@ -3012,7 +3022,7 @@
         </p:nvSpPr>
         <p:spPr>
           <a:xfrm>
-            <a:off x="8610601" y="6356352"/>
+            <a:off x="8610601" y="6356353"/>
             <a:ext cx="2743200" cy="365125"/>
           </a:xfrm>
           <a:prstGeom prst="rect">
@@ -3662,7 +3672,7 @@
         </p:nvSpPr>
         <p:spPr>
           <a:xfrm>
-            <a:off x="3951335" y="1626969"/>
+            <a:off x="3951337" y="1626969"/>
             <a:ext cx="1314893" cy="535800"/>
           </a:xfrm>
           <a:prstGeom prst="rect">
@@ -3740,7 +3750,7 @@
         </p:nvSpPr>
         <p:spPr>
           <a:xfrm>
-            <a:off x="5770663" y="1372610"/>
+            <a:off x="5770665" y="1372612"/>
             <a:ext cx="1403497" cy="1044517"/>
           </a:xfrm>
           <a:prstGeom prst="flowChartDocument">
@@ -3804,7 +3814,7 @@
         </p:nvSpPr>
         <p:spPr>
           <a:xfrm>
-            <a:off x="5770663" y="474680"/>
+            <a:off x="5770665" y="474680"/>
             <a:ext cx="1403497" cy="535800"/>
           </a:xfrm>
           <a:prstGeom prst="rect">
@@ -3956,7 +3966,7 @@
         </p:nvSpPr>
         <p:spPr>
           <a:xfrm>
-            <a:off x="9102203" y="2463834"/>
+            <a:off x="9102205" y="2463834"/>
             <a:ext cx="1314893" cy="1576076"/>
           </a:xfrm>
           <a:prstGeom prst="flowChartMultidocument">
@@ -4080,7 +4090,7 @@
         </p:nvSpPr>
         <p:spPr>
           <a:xfrm>
-            <a:off x="7705355" y="127435"/>
+            <a:off x="7705357" y="127435"/>
             <a:ext cx="1403497" cy="1254642"/>
           </a:xfrm>
           <a:prstGeom prst="flowChartDocument">
@@ -4144,7 +4154,7 @@
         </p:nvSpPr>
         <p:spPr>
           <a:xfrm>
-            <a:off x="9202810" y="1555679"/>
+            <a:off x="9202812" y="1555679"/>
             <a:ext cx="1314893" cy="535800"/>
           </a:xfrm>
           <a:prstGeom prst="rect">
@@ -4594,7 +4604,7 @@
         </p:nvCxnSpPr>
         <p:spPr>
           <a:xfrm>
-            <a:off x="3544470" y="1887065"/>
+            <a:off x="3544472" y="1887065"/>
             <a:ext cx="406865" cy="7804"/>
           </a:xfrm>
           <a:prstGeom prst="straightConnector1">
@@ -4640,7 +4650,7 @@
         </p:nvCxnSpPr>
         <p:spPr>
           <a:xfrm>
-            <a:off x="5266228" y="1894869"/>
+            <a:off x="5266230" y="1894869"/>
             <a:ext cx="504435" cy="0"/>
           </a:xfrm>
           <a:prstGeom prst="straightConnector1">
@@ -4732,7 +4742,7 @@
         </p:nvCxnSpPr>
         <p:spPr>
           <a:xfrm>
-            <a:off x="7174160" y="742580"/>
+            <a:off x="7174162" y="742580"/>
             <a:ext cx="531195" cy="12176"/>
           </a:xfrm>
           <a:prstGeom prst="straightConnector1">
@@ -5092,7 +5102,7 @@
         </p:nvGrpSpPr>
         <p:grpSpPr>
           <a:xfrm>
-            <a:off x="2732107" y="4346261"/>
+            <a:off x="2732109" y="4346263"/>
             <a:ext cx="3366833" cy="429541"/>
             <a:chOff x="2502339" y="3725556"/>
             <a:chExt cx="3366833" cy="429541"/>
@@ -5581,7 +5591,7 @@
         </p:nvGrpSpPr>
         <p:grpSpPr>
           <a:xfrm>
-            <a:off x="2732107" y="6167626"/>
+            <a:off x="2732107" y="6167628"/>
             <a:ext cx="3020836" cy="585729"/>
             <a:chOff x="2502339" y="5260480"/>
             <a:chExt cx="3020836" cy="585729"/>
@@ -5916,7 +5926,7 @@
         </p:nvCxnSpPr>
         <p:spPr>
           <a:xfrm>
-            <a:off x="6205643" y="4428081"/>
+            <a:off x="6205645" y="4428081"/>
             <a:ext cx="531195" cy="12176"/>
           </a:xfrm>
           <a:prstGeom prst="straightConnector1">
@@ -6053,7 +6063,7 @@
         </p:nvSpPr>
         <p:spPr>
           <a:xfrm>
-            <a:off x="8096535" y="2017915"/>
+            <a:off x="8096537" y="2017915"/>
             <a:ext cx="1158185" cy="369332"/>
           </a:xfrm>
           <a:prstGeom prst="rect">
@@ -6095,7 +6105,7 @@
         </p:nvSpPr>
         <p:spPr>
           <a:xfrm>
-            <a:off x="3856342" y="-402603"/>
+            <a:off x="3856342" y="-402602"/>
             <a:ext cx="5346468" cy="2861185"/>
           </a:xfrm>
           <a:prstGeom prst="rect">
@@ -6148,7 +6158,7 @@
         </p:nvSpPr>
         <p:spPr>
           <a:xfrm>
-            <a:off x="3951335" y="1257637"/>
+            <a:off x="3951337" y="1257637"/>
             <a:ext cx="1314893" cy="338554"/>
           </a:xfrm>
           <a:prstGeom prst="rect">
@@ -6191,7 +6201,7 @@
         </p:nvSpPr>
         <p:spPr>
           <a:xfrm>
-            <a:off x="5763783" y="138292"/>
+            <a:off x="5763785" y="138292"/>
             <a:ext cx="1403497" cy="338554"/>
           </a:xfrm>
           <a:prstGeom prst="rect">
@@ -6414,6 +6424,1388 @@
     <p:extLst>
       <p:ext uri="{BB962C8B-B14F-4D97-AF65-F5344CB8AC3E}">
         <p14:creationId xmlns:p14="http://schemas.microsoft.com/office/powerpoint/2010/main" val="2585779796"/>
+      </p:ext>
+    </p:extLst>
+  </p:cSld>
+  <p:clrMapOvr>
+    <a:masterClrMapping/>
+  </p:clrMapOvr>
+</p:sld>
+</file>
+
+<file path=ppt/slides/slide10.xml><?xml version="1.0" encoding="utf-8"?>
+<p:sld xmlns:a="http://schemas.openxmlformats.org/drawingml/2006/main" xmlns:r="http://schemas.openxmlformats.org/officeDocument/2006/relationships" xmlns:p="http://schemas.openxmlformats.org/presentationml/2006/main">
+  <p:cSld>
+    <p:spTree>
+      <p:nvGrpSpPr>
+        <p:cNvPr id="1" name=""/>
+        <p:cNvGrpSpPr/>
+        <p:nvPr/>
+      </p:nvGrpSpPr>
+      <p:grpSpPr>
+        <a:xfrm>
+          <a:off x="0" y="0"/>
+          <a:ext cx="0" cy="0"/>
+          <a:chOff x="0" y="0"/>
+          <a:chExt cx="0" cy="0"/>
+        </a:xfrm>
+      </p:grpSpPr>
+      <p:pic>
+        <p:nvPicPr>
+          <p:cNvPr id="3" name="Picture 2">
+            <a:extLst>
+              <a:ext uri="{FF2B5EF4-FFF2-40B4-BE49-F238E27FC236}">
+                <a16:creationId xmlns:a16="http://schemas.microsoft.com/office/drawing/2014/main" id="{F77D915C-4A88-48F6-EB3D-3990812F5C4B}"/>
+              </a:ext>
+            </a:extLst>
+          </p:cNvPr>
+          <p:cNvPicPr>
+            <a:picLocks noChangeAspect="1"/>
+          </p:cNvPicPr>
+          <p:nvPr/>
+        </p:nvPicPr>
+        <p:blipFill>
+          <a:blip r:embed="rId2">
+            <a:extLst>
+              <a:ext uri="{28A0092B-C50C-407E-A947-70E740481C1C}">
+                <a14:useLocalDpi xmlns:a14="http://schemas.microsoft.com/office/drawing/2010/main" val="0"/>
+              </a:ext>
+            </a:extLst>
+          </a:blip>
+          <a:srcRect/>
+          <a:stretch/>
+        </p:blipFill>
+        <p:spPr>
+          <a:xfrm>
+            <a:off x="674036" y="1562612"/>
+            <a:ext cx="5233578" cy="3732773"/>
+          </a:xfrm>
+          <a:prstGeom prst="rect">
+            <a:avLst/>
+          </a:prstGeom>
+        </p:spPr>
+      </p:pic>
+      <p:pic>
+        <p:nvPicPr>
+          <p:cNvPr id="14" name="Picture 13">
+            <a:extLst>
+              <a:ext uri="{FF2B5EF4-FFF2-40B4-BE49-F238E27FC236}">
+                <a16:creationId xmlns:a16="http://schemas.microsoft.com/office/drawing/2014/main" id="{F875FC0D-B458-5720-7909-5EE5A5B99C70}"/>
+              </a:ext>
+            </a:extLst>
+          </p:cNvPr>
+          <p:cNvPicPr>
+            <a:picLocks noChangeAspect="1"/>
+          </p:cNvPicPr>
+          <p:nvPr/>
+        </p:nvPicPr>
+        <p:blipFill>
+          <a:blip r:embed="rId3">
+            <a:extLst>
+              <a:ext uri="{28A0092B-C50C-407E-A947-70E740481C1C}">
+                <a14:useLocalDpi xmlns:a14="http://schemas.microsoft.com/office/drawing/2010/main" val="0"/>
+              </a:ext>
+            </a:extLst>
+          </a:blip>
+          <a:srcRect/>
+          <a:stretch/>
+        </p:blipFill>
+        <p:spPr>
+          <a:xfrm>
+            <a:off x="6282436" y="1555995"/>
+            <a:ext cx="5237476" cy="3746010"/>
+          </a:xfrm>
+          <a:prstGeom prst="rect">
+            <a:avLst/>
+          </a:prstGeom>
+        </p:spPr>
+      </p:pic>
+      <p:sp>
+        <p:nvSpPr>
+          <p:cNvPr id="15" name="TextBox 14">
+            <a:extLst>
+              <a:ext uri="{FF2B5EF4-FFF2-40B4-BE49-F238E27FC236}">
+                <a16:creationId xmlns:a16="http://schemas.microsoft.com/office/drawing/2014/main" id="{E84CFC9B-D976-D841-FE37-EC7C8D360B2C}"/>
+              </a:ext>
+            </a:extLst>
+          </p:cNvPr>
+          <p:cNvSpPr txBox="1"/>
+          <p:nvPr/>
+        </p:nvSpPr>
+        <p:spPr>
+          <a:xfrm>
+            <a:off x="1527464" y="1143000"/>
+            <a:ext cx="3740727" cy="369332"/>
+          </a:xfrm>
+          <a:prstGeom prst="rect">
+            <a:avLst/>
+          </a:prstGeom>
+          <a:noFill/>
+        </p:spPr>
+        <p:txBody>
+          <a:bodyPr wrap="square" rtlCol="0">
+            <a:spAutoFit/>
+          </a:bodyPr>
+          <a:lstStyle/>
+          <a:p>
+            <a:pPr algn="ctr"/>
+            <a:r>
+              <a:rPr lang="de-DE" dirty="0"/>
+              <a:t>DistilBERT-FLS</a:t>
+            </a:r>
+            <a:endParaRPr lang="en-GB" dirty="0"/>
+          </a:p>
+        </p:txBody>
+      </p:sp>
+      <p:sp>
+        <p:nvSpPr>
+          <p:cNvPr id="16" name="TextBox 15">
+            <a:extLst>
+              <a:ext uri="{FF2B5EF4-FFF2-40B4-BE49-F238E27FC236}">
+                <a16:creationId xmlns:a16="http://schemas.microsoft.com/office/drawing/2014/main" id="{1216E40F-238A-8967-EBA8-49CA3A5B9CDA}"/>
+              </a:ext>
+            </a:extLst>
+          </p:cNvPr>
+          <p:cNvSpPr txBox="1"/>
+          <p:nvPr/>
+        </p:nvSpPr>
+        <p:spPr>
+          <a:xfrm>
+            <a:off x="7030812" y="1200207"/>
+            <a:ext cx="3740727" cy="369332"/>
+          </a:xfrm>
+          <a:prstGeom prst="rect">
+            <a:avLst/>
+          </a:prstGeom>
+          <a:noFill/>
+        </p:spPr>
+        <p:txBody>
+          <a:bodyPr wrap="square" rtlCol="0">
+            <a:spAutoFit/>
+          </a:bodyPr>
+          <a:lstStyle/>
+          <a:p>
+            <a:pPr algn="ctr"/>
+            <a:r>
+              <a:rPr lang="de-DE" dirty="0"/>
+              <a:t>FinBERT-FLS</a:t>
+            </a:r>
+            <a:endParaRPr lang="en-GB" dirty="0"/>
+          </a:p>
+        </p:txBody>
+      </p:sp>
+    </p:spTree>
+    <p:extLst>
+      <p:ext uri="{BB962C8B-B14F-4D97-AF65-F5344CB8AC3E}">
+        <p14:creationId xmlns:p14="http://schemas.microsoft.com/office/powerpoint/2010/main" val="880063914"/>
+      </p:ext>
+    </p:extLst>
+  </p:cSld>
+  <p:clrMapOvr>
+    <a:masterClrMapping/>
+  </p:clrMapOvr>
+</p:sld>
+</file>
+
+<file path=ppt/slides/slide11.xml><?xml version="1.0" encoding="utf-8"?>
+<p:sld xmlns:a="http://schemas.openxmlformats.org/drawingml/2006/main" xmlns:r="http://schemas.openxmlformats.org/officeDocument/2006/relationships" xmlns:p="http://schemas.openxmlformats.org/presentationml/2006/main">
+  <p:cSld>
+    <p:bg>
+      <p:bgPr>
+        <a:solidFill>
+          <a:schemeClr val="bg1"/>
+        </a:solidFill>
+        <a:effectLst/>
+      </p:bgPr>
+    </p:bg>
+    <p:spTree>
+      <p:nvGrpSpPr>
+        <p:cNvPr id="1" name=""/>
+        <p:cNvGrpSpPr/>
+        <p:nvPr/>
+      </p:nvGrpSpPr>
+      <p:grpSpPr>
+        <a:xfrm>
+          <a:off x="0" y="0"/>
+          <a:ext cx="0" cy="0"/>
+          <a:chOff x="0" y="0"/>
+          <a:chExt cx="0" cy="0"/>
+        </a:xfrm>
+      </p:grpSpPr>
+      <p:pic>
+        <p:nvPicPr>
+          <p:cNvPr id="17" name="Picture 16">
+            <a:extLst>
+              <a:ext uri="{FF2B5EF4-FFF2-40B4-BE49-F238E27FC236}">
+                <a16:creationId xmlns:a16="http://schemas.microsoft.com/office/drawing/2014/main" id="{04191FB2-6EE6-FE29-D7FC-F5197800BCEC}"/>
+              </a:ext>
+            </a:extLst>
+          </p:cNvPr>
+          <p:cNvPicPr>
+            <a:picLocks noChangeAspect="1"/>
+          </p:cNvPicPr>
+          <p:nvPr/>
+        </p:nvPicPr>
+        <p:blipFill>
+          <a:blip r:embed="rId2">
+            <a:extLst>
+              <a:ext uri="{28A0092B-C50C-407E-A947-70E740481C1C}">
+                <a14:useLocalDpi xmlns:a14="http://schemas.microsoft.com/office/drawing/2010/main" val="0"/>
+              </a:ext>
+            </a:extLst>
+          </a:blip>
+          <a:srcRect/>
+          <a:stretch/>
+        </p:blipFill>
+        <p:spPr>
+          <a:xfrm>
+            <a:off x="643467" y="907128"/>
+            <a:ext cx="3278292" cy="2097339"/>
+          </a:xfrm>
+          <a:prstGeom prst="rect">
+            <a:avLst/>
+          </a:prstGeom>
+        </p:spPr>
+      </p:pic>
+      <p:pic>
+        <p:nvPicPr>
+          <p:cNvPr id="4" name="Picture 3">
+            <a:extLst>
+              <a:ext uri="{FF2B5EF4-FFF2-40B4-BE49-F238E27FC236}">
+                <a16:creationId xmlns:a16="http://schemas.microsoft.com/office/drawing/2014/main" id="{E48FBA19-BB38-C129-032E-58E7643DB8D6}"/>
+              </a:ext>
+            </a:extLst>
+          </p:cNvPr>
+          <p:cNvPicPr>
+            <a:picLocks noChangeAspect="1"/>
+          </p:cNvPicPr>
+          <p:nvPr/>
+        </p:nvPicPr>
+        <p:blipFill>
+          <a:blip r:embed="rId3">
+            <a:extLst>
+              <a:ext uri="{28A0092B-C50C-407E-A947-70E740481C1C}">
+                <a14:useLocalDpi xmlns:a14="http://schemas.microsoft.com/office/drawing/2010/main" val="0"/>
+              </a:ext>
+            </a:extLst>
+          </a:blip>
+          <a:srcRect/>
+          <a:stretch/>
+        </p:blipFill>
+        <p:spPr>
+          <a:xfrm>
+            <a:off x="4243493" y="758303"/>
+            <a:ext cx="3743538" cy="2394988"/>
+          </a:xfrm>
+          <a:prstGeom prst="rect">
+            <a:avLst/>
+          </a:prstGeom>
+        </p:spPr>
+      </p:pic>
+      <p:pic>
+        <p:nvPicPr>
+          <p:cNvPr id="12" name="Picture 11">
+            <a:extLst>
+              <a:ext uri="{FF2B5EF4-FFF2-40B4-BE49-F238E27FC236}">
+                <a16:creationId xmlns:a16="http://schemas.microsoft.com/office/drawing/2014/main" id="{E50F2872-0D39-44C6-795A-F41634BBD80E}"/>
+              </a:ext>
+            </a:extLst>
+          </p:cNvPr>
+          <p:cNvPicPr>
+            <a:picLocks noChangeAspect="1"/>
+          </p:cNvPicPr>
+          <p:nvPr/>
+        </p:nvPicPr>
+        <p:blipFill>
+          <a:blip r:embed="rId4">
+            <a:extLst>
+              <a:ext uri="{28A0092B-C50C-407E-A947-70E740481C1C}">
+                <a14:useLocalDpi xmlns:a14="http://schemas.microsoft.com/office/drawing/2010/main" val="0"/>
+              </a:ext>
+            </a:extLst>
+          </a:blip>
+          <a:srcRect/>
+          <a:stretch/>
+        </p:blipFill>
+        <p:spPr>
+          <a:xfrm>
+            <a:off x="8308766" y="919450"/>
+            <a:ext cx="3239769" cy="2072694"/>
+          </a:xfrm>
+          <a:prstGeom prst="rect">
+            <a:avLst/>
+          </a:prstGeom>
+        </p:spPr>
+      </p:pic>
+      <p:pic>
+        <p:nvPicPr>
+          <p:cNvPr id="6" name="Picture 5">
+            <a:extLst>
+              <a:ext uri="{FF2B5EF4-FFF2-40B4-BE49-F238E27FC236}">
+                <a16:creationId xmlns:a16="http://schemas.microsoft.com/office/drawing/2014/main" id="{CF029A79-B2A5-B795-E595-F752D39BCAB9}"/>
+              </a:ext>
+            </a:extLst>
+          </p:cNvPr>
+          <p:cNvPicPr>
+            <a:picLocks noChangeAspect="1"/>
+          </p:cNvPicPr>
+          <p:nvPr/>
+        </p:nvPicPr>
+        <p:blipFill>
+          <a:blip r:embed="rId5">
+            <a:extLst>
+              <a:ext uri="{28A0092B-C50C-407E-A947-70E740481C1C}">
+                <a14:useLocalDpi xmlns:a14="http://schemas.microsoft.com/office/drawing/2010/main" val="0"/>
+              </a:ext>
+            </a:extLst>
+          </a:blip>
+          <a:srcRect/>
+          <a:stretch/>
+        </p:blipFill>
+        <p:spPr>
+          <a:xfrm>
+            <a:off x="643467" y="3853526"/>
+            <a:ext cx="3278292" cy="2097339"/>
+          </a:xfrm>
+          <a:prstGeom prst="rect">
+            <a:avLst/>
+          </a:prstGeom>
+        </p:spPr>
+      </p:pic>
+      <p:pic>
+        <p:nvPicPr>
+          <p:cNvPr id="10" name="Picture 9">
+            <a:extLst>
+              <a:ext uri="{FF2B5EF4-FFF2-40B4-BE49-F238E27FC236}">
+                <a16:creationId xmlns:a16="http://schemas.microsoft.com/office/drawing/2014/main" id="{FF6A95A3-13E3-3989-B296-F4935EF3880E}"/>
+              </a:ext>
+            </a:extLst>
+          </p:cNvPr>
+          <p:cNvPicPr>
+            <a:picLocks noChangeAspect="1"/>
+          </p:cNvPicPr>
+          <p:nvPr/>
+        </p:nvPicPr>
+        <p:blipFill>
+          <a:blip r:embed="rId6">
+            <a:extLst>
+              <a:ext uri="{28A0092B-C50C-407E-A947-70E740481C1C}">
+                <a14:useLocalDpi xmlns:a14="http://schemas.microsoft.com/office/drawing/2010/main" val="0"/>
+              </a:ext>
+            </a:extLst>
+          </a:blip>
+          <a:srcRect/>
+          <a:stretch/>
+        </p:blipFill>
+        <p:spPr>
+          <a:xfrm>
+            <a:off x="4243494" y="3714365"/>
+            <a:ext cx="3743538" cy="2394988"/>
+          </a:xfrm>
+          <a:prstGeom prst="rect">
+            <a:avLst/>
+          </a:prstGeom>
+        </p:spPr>
+      </p:pic>
+      <p:pic>
+        <p:nvPicPr>
+          <p:cNvPr id="8" name="Picture 7">
+            <a:extLst>
+              <a:ext uri="{FF2B5EF4-FFF2-40B4-BE49-F238E27FC236}">
+                <a16:creationId xmlns:a16="http://schemas.microsoft.com/office/drawing/2014/main" id="{63F08613-73E0-CFEA-5FCA-F43D3FC714EB}"/>
+              </a:ext>
+            </a:extLst>
+          </p:cNvPr>
+          <p:cNvPicPr>
+            <a:picLocks noChangeAspect="1"/>
+          </p:cNvPicPr>
+          <p:nvPr/>
+        </p:nvPicPr>
+        <p:blipFill>
+          <a:blip r:embed="rId7">
+            <a:extLst>
+              <a:ext uri="{28A0092B-C50C-407E-A947-70E740481C1C}">
+                <a14:useLocalDpi xmlns:a14="http://schemas.microsoft.com/office/drawing/2010/main" val="0"/>
+              </a:ext>
+            </a:extLst>
+          </a:blip>
+          <a:srcRect/>
+          <a:stretch/>
+        </p:blipFill>
+        <p:spPr>
+          <a:xfrm>
+            <a:off x="8308765" y="3875512"/>
+            <a:ext cx="3239769" cy="2072694"/>
+          </a:xfrm>
+          <a:prstGeom prst="rect">
+            <a:avLst/>
+          </a:prstGeom>
+        </p:spPr>
+      </p:pic>
+    </p:spTree>
+    <p:extLst>
+      <p:ext uri="{BB962C8B-B14F-4D97-AF65-F5344CB8AC3E}">
+        <p14:creationId xmlns:p14="http://schemas.microsoft.com/office/powerpoint/2010/main" val="3393009485"/>
+      </p:ext>
+    </p:extLst>
+  </p:cSld>
+  <p:clrMapOvr>
+    <a:masterClrMapping/>
+  </p:clrMapOvr>
+</p:sld>
+</file>
+
+<file path=ppt/slides/slide12.xml><?xml version="1.0" encoding="utf-8"?>
+<p:sld xmlns:a="http://schemas.openxmlformats.org/drawingml/2006/main" xmlns:r="http://schemas.openxmlformats.org/officeDocument/2006/relationships" xmlns:p="http://schemas.openxmlformats.org/presentationml/2006/main">
+  <p:cSld>
+    <p:spTree>
+      <p:nvGrpSpPr>
+        <p:cNvPr id="1" name=""/>
+        <p:cNvGrpSpPr/>
+        <p:nvPr/>
+      </p:nvGrpSpPr>
+      <p:grpSpPr>
+        <a:xfrm>
+          <a:off x="0" y="0"/>
+          <a:ext cx="0" cy="0"/>
+          <a:chOff x="0" y="0"/>
+          <a:chExt cx="0" cy="0"/>
+        </a:xfrm>
+      </p:grpSpPr>
+      <p:pic>
+        <p:nvPicPr>
+          <p:cNvPr id="17" name="Picture 16">
+            <a:extLst>
+              <a:ext uri="{FF2B5EF4-FFF2-40B4-BE49-F238E27FC236}">
+                <a16:creationId xmlns:a16="http://schemas.microsoft.com/office/drawing/2014/main" id="{04191FB2-6EE6-FE29-D7FC-F5197800BCEC}"/>
+              </a:ext>
+            </a:extLst>
+          </p:cNvPr>
+          <p:cNvPicPr>
+            <a:picLocks noChangeAspect="1"/>
+          </p:cNvPicPr>
+          <p:nvPr/>
+        </p:nvPicPr>
+        <p:blipFill>
+          <a:blip r:embed="rId2">
+            <a:extLst>
+              <a:ext uri="{28A0092B-C50C-407E-A947-70E740481C1C}">
+                <a14:useLocalDpi xmlns:a14="http://schemas.microsoft.com/office/drawing/2010/main" val="0"/>
+              </a:ext>
+            </a:extLst>
+          </a:blip>
+          <a:srcRect/>
+          <a:stretch/>
+        </p:blipFill>
+        <p:spPr>
+          <a:xfrm>
+            <a:off x="643468" y="907128"/>
+            <a:ext cx="3278290" cy="2097339"/>
+          </a:xfrm>
+          <a:prstGeom prst="rect">
+            <a:avLst/>
+          </a:prstGeom>
+        </p:spPr>
+      </p:pic>
+      <p:pic>
+        <p:nvPicPr>
+          <p:cNvPr id="4" name="Picture 3">
+            <a:extLst>
+              <a:ext uri="{FF2B5EF4-FFF2-40B4-BE49-F238E27FC236}">
+                <a16:creationId xmlns:a16="http://schemas.microsoft.com/office/drawing/2014/main" id="{E48FBA19-BB38-C129-032E-58E7643DB8D6}"/>
+              </a:ext>
+            </a:extLst>
+          </p:cNvPr>
+          <p:cNvPicPr>
+            <a:picLocks noChangeAspect="1"/>
+          </p:cNvPicPr>
+          <p:nvPr/>
+        </p:nvPicPr>
+        <p:blipFill>
+          <a:blip r:embed="rId3">
+            <a:extLst>
+              <a:ext uri="{28A0092B-C50C-407E-A947-70E740481C1C}">
+                <a14:useLocalDpi xmlns:a14="http://schemas.microsoft.com/office/drawing/2010/main" val="0"/>
+              </a:ext>
+            </a:extLst>
+          </a:blip>
+          <a:srcRect/>
+          <a:stretch/>
+        </p:blipFill>
+        <p:spPr>
+          <a:xfrm>
+            <a:off x="4243495" y="758303"/>
+            <a:ext cx="3743537" cy="2394988"/>
+          </a:xfrm>
+          <a:prstGeom prst="rect">
+            <a:avLst/>
+          </a:prstGeom>
+        </p:spPr>
+      </p:pic>
+      <p:pic>
+        <p:nvPicPr>
+          <p:cNvPr id="12" name="Picture 11">
+            <a:extLst>
+              <a:ext uri="{FF2B5EF4-FFF2-40B4-BE49-F238E27FC236}">
+                <a16:creationId xmlns:a16="http://schemas.microsoft.com/office/drawing/2014/main" id="{E50F2872-0D39-44C6-795A-F41634BBD80E}"/>
+              </a:ext>
+            </a:extLst>
+          </p:cNvPr>
+          <p:cNvPicPr>
+            <a:picLocks noChangeAspect="1"/>
+          </p:cNvPicPr>
+          <p:nvPr/>
+        </p:nvPicPr>
+        <p:blipFill>
+          <a:blip r:embed="rId4">
+            <a:extLst>
+              <a:ext uri="{28A0092B-C50C-407E-A947-70E740481C1C}">
+                <a14:useLocalDpi xmlns:a14="http://schemas.microsoft.com/office/drawing/2010/main" val="0"/>
+              </a:ext>
+            </a:extLst>
+          </a:blip>
+          <a:srcRect/>
+          <a:stretch/>
+        </p:blipFill>
+        <p:spPr>
+          <a:xfrm>
+            <a:off x="8308764" y="919450"/>
+            <a:ext cx="3239768" cy="2072694"/>
+          </a:xfrm>
+          <a:prstGeom prst="rect">
+            <a:avLst/>
+          </a:prstGeom>
+        </p:spPr>
+      </p:pic>
+      <p:pic>
+        <p:nvPicPr>
+          <p:cNvPr id="6" name="Picture 5">
+            <a:extLst>
+              <a:ext uri="{FF2B5EF4-FFF2-40B4-BE49-F238E27FC236}">
+                <a16:creationId xmlns:a16="http://schemas.microsoft.com/office/drawing/2014/main" id="{CF029A79-B2A5-B795-E595-F752D39BCAB9}"/>
+              </a:ext>
+            </a:extLst>
+          </p:cNvPr>
+          <p:cNvPicPr>
+            <a:picLocks noChangeAspect="1"/>
+          </p:cNvPicPr>
+          <p:nvPr/>
+        </p:nvPicPr>
+        <p:blipFill>
+          <a:blip r:embed="rId5">
+            <a:extLst>
+              <a:ext uri="{28A0092B-C50C-407E-A947-70E740481C1C}">
+                <a14:useLocalDpi xmlns:a14="http://schemas.microsoft.com/office/drawing/2010/main" val="0"/>
+              </a:ext>
+            </a:extLst>
+          </a:blip>
+          <a:srcRect/>
+          <a:stretch/>
+        </p:blipFill>
+        <p:spPr>
+          <a:xfrm>
+            <a:off x="643468" y="3853526"/>
+            <a:ext cx="3278290" cy="2097339"/>
+          </a:xfrm>
+          <a:prstGeom prst="rect">
+            <a:avLst/>
+          </a:prstGeom>
+        </p:spPr>
+      </p:pic>
+      <p:pic>
+        <p:nvPicPr>
+          <p:cNvPr id="10" name="Picture 9">
+            <a:extLst>
+              <a:ext uri="{FF2B5EF4-FFF2-40B4-BE49-F238E27FC236}">
+                <a16:creationId xmlns:a16="http://schemas.microsoft.com/office/drawing/2014/main" id="{FF6A95A3-13E3-3989-B296-F4935EF3880E}"/>
+              </a:ext>
+            </a:extLst>
+          </p:cNvPr>
+          <p:cNvPicPr>
+            <a:picLocks noChangeAspect="1"/>
+          </p:cNvPicPr>
+          <p:nvPr/>
+        </p:nvPicPr>
+        <p:blipFill>
+          <a:blip r:embed="rId6">
+            <a:extLst>
+              <a:ext uri="{28A0092B-C50C-407E-A947-70E740481C1C}">
+                <a14:useLocalDpi xmlns:a14="http://schemas.microsoft.com/office/drawing/2010/main" val="0"/>
+              </a:ext>
+            </a:extLst>
+          </a:blip>
+          <a:srcRect/>
+          <a:stretch/>
+        </p:blipFill>
+        <p:spPr>
+          <a:xfrm>
+            <a:off x="4243496" y="3714365"/>
+            <a:ext cx="3743537" cy="2394988"/>
+          </a:xfrm>
+          <a:prstGeom prst="rect">
+            <a:avLst/>
+          </a:prstGeom>
+        </p:spPr>
+      </p:pic>
+      <p:pic>
+        <p:nvPicPr>
+          <p:cNvPr id="8" name="Picture 7">
+            <a:extLst>
+              <a:ext uri="{FF2B5EF4-FFF2-40B4-BE49-F238E27FC236}">
+                <a16:creationId xmlns:a16="http://schemas.microsoft.com/office/drawing/2014/main" id="{63F08613-73E0-CFEA-5FCA-F43D3FC714EB}"/>
+              </a:ext>
+            </a:extLst>
+          </p:cNvPr>
+          <p:cNvPicPr>
+            <a:picLocks noChangeAspect="1"/>
+          </p:cNvPicPr>
+          <p:nvPr/>
+        </p:nvPicPr>
+        <p:blipFill>
+          <a:blip r:embed="rId7">
+            <a:extLst>
+              <a:ext uri="{28A0092B-C50C-407E-A947-70E740481C1C}">
+                <a14:useLocalDpi xmlns:a14="http://schemas.microsoft.com/office/drawing/2010/main" val="0"/>
+              </a:ext>
+            </a:extLst>
+          </a:blip>
+          <a:srcRect/>
+          <a:stretch/>
+        </p:blipFill>
+        <p:spPr>
+          <a:xfrm>
+            <a:off x="8308763" y="3875512"/>
+            <a:ext cx="3239768" cy="2072694"/>
+          </a:xfrm>
+          <a:prstGeom prst="rect">
+            <a:avLst/>
+          </a:prstGeom>
+        </p:spPr>
+      </p:pic>
+    </p:spTree>
+    <p:extLst>
+      <p:ext uri="{BB962C8B-B14F-4D97-AF65-F5344CB8AC3E}">
+        <p14:creationId xmlns:p14="http://schemas.microsoft.com/office/powerpoint/2010/main" val="1593635250"/>
+      </p:ext>
+    </p:extLst>
+  </p:cSld>
+  <p:clrMapOvr>
+    <a:masterClrMapping/>
+  </p:clrMapOvr>
+</p:sld>
+</file>
+
+<file path=ppt/slides/slide13.xml><?xml version="1.0" encoding="utf-8"?>
+<p:sld xmlns:a="http://schemas.openxmlformats.org/drawingml/2006/main" xmlns:r="http://schemas.openxmlformats.org/officeDocument/2006/relationships" xmlns:p="http://schemas.openxmlformats.org/presentationml/2006/main">
+  <p:cSld>
+    <p:spTree>
+      <p:nvGrpSpPr>
+        <p:cNvPr id="1" name=""/>
+        <p:cNvGrpSpPr/>
+        <p:nvPr/>
+      </p:nvGrpSpPr>
+      <p:grpSpPr>
+        <a:xfrm>
+          <a:off x="0" y="0"/>
+          <a:ext cx="0" cy="0"/>
+          <a:chOff x="0" y="0"/>
+          <a:chExt cx="0" cy="0"/>
+        </a:xfrm>
+      </p:grpSpPr>
+      <p:pic>
+        <p:nvPicPr>
+          <p:cNvPr id="17" name="Picture 16">
+            <a:extLst>
+              <a:ext uri="{FF2B5EF4-FFF2-40B4-BE49-F238E27FC236}">
+                <a16:creationId xmlns:a16="http://schemas.microsoft.com/office/drawing/2014/main" id="{04191FB2-6EE6-FE29-D7FC-F5197800BCEC}"/>
+              </a:ext>
+            </a:extLst>
+          </p:cNvPr>
+          <p:cNvPicPr>
+            <a:picLocks noChangeAspect="1"/>
+          </p:cNvPicPr>
+          <p:nvPr/>
+        </p:nvPicPr>
+        <p:blipFill>
+          <a:blip r:embed="rId2">
+            <a:extLst>
+              <a:ext uri="{28A0092B-C50C-407E-A947-70E740481C1C}">
+                <a14:useLocalDpi xmlns:a14="http://schemas.microsoft.com/office/drawing/2010/main" val="0"/>
+              </a:ext>
+            </a:extLst>
+          </a:blip>
+          <a:srcRect/>
+          <a:stretch/>
+        </p:blipFill>
+        <p:spPr>
+          <a:xfrm>
+            <a:off x="325120" y="609174"/>
+            <a:ext cx="3481869" cy="2395294"/>
+          </a:xfrm>
+          <a:prstGeom prst="rect">
+            <a:avLst/>
+          </a:prstGeom>
+        </p:spPr>
+      </p:pic>
+      <p:pic>
+        <p:nvPicPr>
+          <p:cNvPr id="4" name="Picture 3">
+            <a:extLst>
+              <a:ext uri="{FF2B5EF4-FFF2-40B4-BE49-F238E27FC236}">
+                <a16:creationId xmlns:a16="http://schemas.microsoft.com/office/drawing/2014/main" id="{E48FBA19-BB38-C129-032E-58E7643DB8D6}"/>
+              </a:ext>
+            </a:extLst>
+          </p:cNvPr>
+          <p:cNvPicPr>
+            <a:picLocks noChangeAspect="1"/>
+          </p:cNvPicPr>
+          <p:nvPr/>
+        </p:nvPicPr>
+        <p:blipFill>
+          <a:blip r:embed="rId3">
+            <a:extLst>
+              <a:ext uri="{28A0092B-C50C-407E-A947-70E740481C1C}">
+                <a14:useLocalDpi xmlns:a14="http://schemas.microsoft.com/office/drawing/2010/main" val="0"/>
+              </a:ext>
+            </a:extLst>
+          </a:blip>
+          <a:srcRect/>
+          <a:stretch/>
+        </p:blipFill>
+        <p:spPr>
+          <a:xfrm>
+            <a:off x="3861366" y="418063"/>
+            <a:ext cx="4009095" cy="2735228"/>
+          </a:xfrm>
+          <a:prstGeom prst="rect">
+            <a:avLst/>
+          </a:prstGeom>
+        </p:spPr>
+      </p:pic>
+      <p:pic>
+        <p:nvPicPr>
+          <p:cNvPr id="12" name="Picture 11">
+            <a:extLst>
+              <a:ext uri="{FF2B5EF4-FFF2-40B4-BE49-F238E27FC236}">
+                <a16:creationId xmlns:a16="http://schemas.microsoft.com/office/drawing/2014/main" id="{E50F2872-0D39-44C6-795A-F41634BBD80E}"/>
+              </a:ext>
+            </a:extLst>
+          </p:cNvPr>
+          <p:cNvPicPr>
+            <a:picLocks noChangeAspect="1"/>
+          </p:cNvPicPr>
+          <p:nvPr/>
+        </p:nvPicPr>
+        <p:blipFill>
+          <a:blip r:embed="rId4">
+            <a:extLst>
+              <a:ext uri="{28A0092B-C50C-407E-A947-70E740481C1C}">
+                <a14:useLocalDpi xmlns:a14="http://schemas.microsoft.com/office/drawing/2010/main" val="0"/>
+              </a:ext>
+            </a:extLst>
+          </a:blip>
+          <a:srcRect/>
+          <a:stretch/>
+        </p:blipFill>
+        <p:spPr>
+          <a:xfrm>
+            <a:off x="7956596" y="624996"/>
+            <a:ext cx="3507769" cy="2367148"/>
+          </a:xfrm>
+          <a:prstGeom prst="rect">
+            <a:avLst/>
+          </a:prstGeom>
+        </p:spPr>
+      </p:pic>
+      <p:pic>
+        <p:nvPicPr>
+          <p:cNvPr id="6" name="Picture 5">
+            <a:extLst>
+              <a:ext uri="{FF2B5EF4-FFF2-40B4-BE49-F238E27FC236}">
+                <a16:creationId xmlns:a16="http://schemas.microsoft.com/office/drawing/2014/main" id="{CF029A79-B2A5-B795-E595-F752D39BCAB9}"/>
+              </a:ext>
+            </a:extLst>
+          </p:cNvPr>
+          <p:cNvPicPr>
+            <a:picLocks noChangeAspect="1"/>
+          </p:cNvPicPr>
+          <p:nvPr/>
+        </p:nvPicPr>
+        <p:blipFill>
+          <a:blip r:embed="rId5">
+            <a:extLst>
+              <a:ext uri="{28A0092B-C50C-407E-A947-70E740481C1C}">
+                <a14:useLocalDpi xmlns:a14="http://schemas.microsoft.com/office/drawing/2010/main" val="0"/>
+              </a:ext>
+            </a:extLst>
+          </a:blip>
+          <a:srcRect/>
+          <a:stretch/>
+        </p:blipFill>
+        <p:spPr>
+          <a:xfrm>
+            <a:off x="292541" y="3555572"/>
+            <a:ext cx="3539820" cy="2395294"/>
+          </a:xfrm>
+          <a:prstGeom prst="rect">
+            <a:avLst/>
+          </a:prstGeom>
+        </p:spPr>
+      </p:pic>
+      <p:pic>
+        <p:nvPicPr>
+          <p:cNvPr id="10" name="Picture 9">
+            <a:extLst>
+              <a:ext uri="{FF2B5EF4-FFF2-40B4-BE49-F238E27FC236}">
+                <a16:creationId xmlns:a16="http://schemas.microsoft.com/office/drawing/2014/main" id="{FF6A95A3-13E3-3989-B296-F4935EF3880E}"/>
+              </a:ext>
+            </a:extLst>
+          </p:cNvPr>
+          <p:cNvPicPr>
+            <a:picLocks noChangeAspect="1"/>
+          </p:cNvPicPr>
+          <p:nvPr/>
+        </p:nvPicPr>
+        <p:blipFill>
+          <a:blip r:embed="rId6">
+            <a:extLst>
+              <a:ext uri="{28A0092B-C50C-407E-A947-70E740481C1C}">
+                <a14:useLocalDpi xmlns:a14="http://schemas.microsoft.com/office/drawing/2010/main" val="0"/>
+              </a:ext>
+            </a:extLst>
+          </a:blip>
+          <a:srcRect/>
+          <a:stretch/>
+        </p:blipFill>
+        <p:spPr>
+          <a:xfrm>
+            <a:off x="3861367" y="3374125"/>
+            <a:ext cx="4009095" cy="2735228"/>
+          </a:xfrm>
+          <a:prstGeom prst="rect">
+            <a:avLst/>
+          </a:prstGeom>
+        </p:spPr>
+      </p:pic>
+      <p:pic>
+        <p:nvPicPr>
+          <p:cNvPr id="8" name="Picture 7">
+            <a:extLst>
+              <a:ext uri="{FF2B5EF4-FFF2-40B4-BE49-F238E27FC236}">
+                <a16:creationId xmlns:a16="http://schemas.microsoft.com/office/drawing/2014/main" id="{63F08613-73E0-CFEA-5FCA-F43D3FC714EB}"/>
+              </a:ext>
+            </a:extLst>
+          </p:cNvPr>
+          <p:cNvPicPr>
+            <a:picLocks noChangeAspect="1"/>
+          </p:cNvPicPr>
+          <p:nvPr/>
+        </p:nvPicPr>
+        <p:blipFill>
+          <a:blip r:embed="rId7">
+            <a:extLst>
+              <a:ext uri="{28A0092B-C50C-407E-A947-70E740481C1C}">
+                <a14:useLocalDpi xmlns:a14="http://schemas.microsoft.com/office/drawing/2010/main" val="0"/>
+              </a:ext>
+            </a:extLst>
+          </a:blip>
+          <a:srcRect/>
+          <a:stretch/>
+        </p:blipFill>
+        <p:spPr>
+          <a:xfrm>
+            <a:off x="7961960" y="3581061"/>
+            <a:ext cx="3498224" cy="2367147"/>
+          </a:xfrm>
+          <a:prstGeom prst="rect">
+            <a:avLst/>
+          </a:prstGeom>
+        </p:spPr>
+      </p:pic>
+    </p:spTree>
+    <p:extLst>
+      <p:ext uri="{BB962C8B-B14F-4D97-AF65-F5344CB8AC3E}">
+        <p14:creationId xmlns:p14="http://schemas.microsoft.com/office/powerpoint/2010/main" val="4251467259"/>
+      </p:ext>
+    </p:extLst>
+  </p:cSld>
+  <p:clrMapOvr>
+    <a:masterClrMapping/>
+  </p:clrMapOvr>
+</p:sld>
+</file>
+
+<file path=ppt/slides/slide14.xml><?xml version="1.0" encoding="utf-8"?>
+<p:sld xmlns:a="http://schemas.openxmlformats.org/drawingml/2006/main" xmlns:r="http://schemas.openxmlformats.org/officeDocument/2006/relationships" xmlns:p="http://schemas.openxmlformats.org/presentationml/2006/main">
+  <p:cSld>
+    <p:spTree>
+      <p:nvGrpSpPr>
+        <p:cNvPr id="1" name=""/>
+        <p:cNvGrpSpPr/>
+        <p:nvPr/>
+      </p:nvGrpSpPr>
+      <p:grpSpPr>
+        <a:xfrm>
+          <a:off x="0" y="0"/>
+          <a:ext cx="0" cy="0"/>
+          <a:chOff x="0" y="0"/>
+          <a:chExt cx="0" cy="0"/>
+        </a:xfrm>
+      </p:grpSpPr>
+      <p:pic>
+        <p:nvPicPr>
+          <p:cNvPr id="17" name="Picture 16">
+            <a:extLst>
+              <a:ext uri="{FF2B5EF4-FFF2-40B4-BE49-F238E27FC236}">
+                <a16:creationId xmlns:a16="http://schemas.microsoft.com/office/drawing/2014/main" id="{04191FB2-6EE6-FE29-D7FC-F5197800BCEC}"/>
+              </a:ext>
+            </a:extLst>
+          </p:cNvPr>
+          <p:cNvPicPr>
+            <a:picLocks noChangeAspect="1"/>
+          </p:cNvPicPr>
+          <p:nvPr/>
+        </p:nvPicPr>
+        <p:blipFill>
+          <a:blip r:embed="rId2">
+            <a:extLst>
+              <a:ext uri="{28A0092B-C50C-407E-A947-70E740481C1C}">
+                <a14:useLocalDpi xmlns:a14="http://schemas.microsoft.com/office/drawing/2010/main" val="0"/>
+              </a:ext>
+            </a:extLst>
+          </a:blip>
+          <a:srcRect/>
+          <a:stretch/>
+        </p:blipFill>
+        <p:spPr>
+          <a:xfrm>
+            <a:off x="325120" y="609174"/>
+            <a:ext cx="3481869" cy="2395294"/>
+          </a:xfrm>
+          <a:prstGeom prst="rect">
+            <a:avLst/>
+          </a:prstGeom>
+        </p:spPr>
+      </p:pic>
+      <p:pic>
+        <p:nvPicPr>
+          <p:cNvPr id="4" name="Picture 3">
+            <a:extLst>
+              <a:ext uri="{FF2B5EF4-FFF2-40B4-BE49-F238E27FC236}">
+                <a16:creationId xmlns:a16="http://schemas.microsoft.com/office/drawing/2014/main" id="{E48FBA19-BB38-C129-032E-58E7643DB8D6}"/>
+              </a:ext>
+            </a:extLst>
+          </p:cNvPr>
+          <p:cNvPicPr>
+            <a:picLocks noChangeAspect="1"/>
+          </p:cNvPicPr>
+          <p:nvPr/>
+        </p:nvPicPr>
+        <p:blipFill>
+          <a:blip r:embed="rId3">
+            <a:extLst>
+              <a:ext uri="{28A0092B-C50C-407E-A947-70E740481C1C}">
+                <a14:useLocalDpi xmlns:a14="http://schemas.microsoft.com/office/drawing/2010/main" val="0"/>
+              </a:ext>
+            </a:extLst>
+          </a:blip>
+          <a:srcRect/>
+          <a:stretch/>
+        </p:blipFill>
+        <p:spPr>
+          <a:xfrm>
+            <a:off x="3861366" y="418063"/>
+            <a:ext cx="4009095" cy="2735228"/>
+          </a:xfrm>
+          <a:prstGeom prst="rect">
+            <a:avLst/>
+          </a:prstGeom>
+        </p:spPr>
+      </p:pic>
+      <p:pic>
+        <p:nvPicPr>
+          <p:cNvPr id="12" name="Picture 11">
+            <a:extLst>
+              <a:ext uri="{FF2B5EF4-FFF2-40B4-BE49-F238E27FC236}">
+                <a16:creationId xmlns:a16="http://schemas.microsoft.com/office/drawing/2014/main" id="{E50F2872-0D39-44C6-795A-F41634BBD80E}"/>
+              </a:ext>
+            </a:extLst>
+          </p:cNvPr>
+          <p:cNvPicPr>
+            <a:picLocks noChangeAspect="1"/>
+          </p:cNvPicPr>
+          <p:nvPr/>
+        </p:nvPicPr>
+        <p:blipFill>
+          <a:blip r:embed="rId4">
+            <a:extLst>
+              <a:ext uri="{28A0092B-C50C-407E-A947-70E740481C1C}">
+                <a14:useLocalDpi xmlns:a14="http://schemas.microsoft.com/office/drawing/2010/main" val="0"/>
+              </a:ext>
+            </a:extLst>
+          </a:blip>
+          <a:srcRect/>
+          <a:stretch/>
+        </p:blipFill>
+        <p:spPr>
+          <a:xfrm>
+            <a:off x="7956596" y="624996"/>
+            <a:ext cx="3507769" cy="2367148"/>
+          </a:xfrm>
+          <a:prstGeom prst="rect">
+            <a:avLst/>
+          </a:prstGeom>
+        </p:spPr>
+      </p:pic>
+      <p:pic>
+        <p:nvPicPr>
+          <p:cNvPr id="6" name="Picture 5">
+            <a:extLst>
+              <a:ext uri="{FF2B5EF4-FFF2-40B4-BE49-F238E27FC236}">
+                <a16:creationId xmlns:a16="http://schemas.microsoft.com/office/drawing/2014/main" id="{CF029A79-B2A5-B795-E595-F752D39BCAB9}"/>
+              </a:ext>
+            </a:extLst>
+          </p:cNvPr>
+          <p:cNvPicPr>
+            <a:picLocks noChangeAspect="1"/>
+          </p:cNvPicPr>
+          <p:nvPr/>
+        </p:nvPicPr>
+        <p:blipFill>
+          <a:blip r:embed="rId5">
+            <a:extLst>
+              <a:ext uri="{28A0092B-C50C-407E-A947-70E740481C1C}">
+                <a14:useLocalDpi xmlns:a14="http://schemas.microsoft.com/office/drawing/2010/main" val="0"/>
+              </a:ext>
+            </a:extLst>
+          </a:blip>
+          <a:srcRect/>
+          <a:stretch/>
+        </p:blipFill>
+        <p:spPr>
+          <a:xfrm>
+            <a:off x="292541" y="3555572"/>
+            <a:ext cx="3539820" cy="2395294"/>
+          </a:xfrm>
+          <a:prstGeom prst="rect">
+            <a:avLst/>
+          </a:prstGeom>
+        </p:spPr>
+      </p:pic>
+      <p:pic>
+        <p:nvPicPr>
+          <p:cNvPr id="10" name="Picture 9">
+            <a:extLst>
+              <a:ext uri="{FF2B5EF4-FFF2-40B4-BE49-F238E27FC236}">
+                <a16:creationId xmlns:a16="http://schemas.microsoft.com/office/drawing/2014/main" id="{FF6A95A3-13E3-3989-B296-F4935EF3880E}"/>
+              </a:ext>
+            </a:extLst>
+          </p:cNvPr>
+          <p:cNvPicPr>
+            <a:picLocks noChangeAspect="1"/>
+          </p:cNvPicPr>
+          <p:nvPr/>
+        </p:nvPicPr>
+        <p:blipFill>
+          <a:blip r:embed="rId6">
+            <a:extLst>
+              <a:ext uri="{28A0092B-C50C-407E-A947-70E740481C1C}">
+                <a14:useLocalDpi xmlns:a14="http://schemas.microsoft.com/office/drawing/2010/main" val="0"/>
+              </a:ext>
+            </a:extLst>
+          </a:blip>
+          <a:srcRect/>
+          <a:stretch/>
+        </p:blipFill>
+        <p:spPr>
+          <a:xfrm>
+            <a:off x="3861367" y="3374125"/>
+            <a:ext cx="4009095" cy="2735228"/>
+          </a:xfrm>
+          <a:prstGeom prst="rect">
+            <a:avLst/>
+          </a:prstGeom>
+        </p:spPr>
+      </p:pic>
+      <p:pic>
+        <p:nvPicPr>
+          <p:cNvPr id="8" name="Picture 7">
+            <a:extLst>
+              <a:ext uri="{FF2B5EF4-FFF2-40B4-BE49-F238E27FC236}">
+                <a16:creationId xmlns:a16="http://schemas.microsoft.com/office/drawing/2014/main" id="{63F08613-73E0-CFEA-5FCA-F43D3FC714EB}"/>
+              </a:ext>
+            </a:extLst>
+          </p:cNvPr>
+          <p:cNvPicPr>
+            <a:picLocks noChangeAspect="1"/>
+          </p:cNvPicPr>
+          <p:nvPr/>
+        </p:nvPicPr>
+        <p:blipFill>
+          <a:blip r:embed="rId7">
+            <a:extLst>
+              <a:ext uri="{28A0092B-C50C-407E-A947-70E740481C1C}">
+                <a14:useLocalDpi xmlns:a14="http://schemas.microsoft.com/office/drawing/2010/main" val="0"/>
+              </a:ext>
+            </a:extLst>
+          </a:blip>
+          <a:srcRect/>
+          <a:stretch/>
+        </p:blipFill>
+        <p:spPr>
+          <a:xfrm>
+            <a:off x="7961960" y="3581061"/>
+            <a:ext cx="3498224" cy="2367147"/>
+          </a:xfrm>
+          <a:prstGeom prst="rect">
+            <a:avLst/>
+          </a:prstGeom>
+        </p:spPr>
+      </p:pic>
+    </p:spTree>
+    <p:extLst>
+      <p:ext uri="{BB962C8B-B14F-4D97-AF65-F5344CB8AC3E}">
+        <p14:creationId xmlns:p14="http://schemas.microsoft.com/office/powerpoint/2010/main" val="333710762"/>
+      </p:ext>
+    </p:extLst>
+  </p:cSld>
+  <p:clrMapOvr>
+    <a:masterClrMapping/>
+  </p:clrMapOvr>
+</p:sld>
+</file>
+
+<file path=ppt/slides/slide15.xml><?xml version="1.0" encoding="utf-8"?>
+<p:sld xmlns:a="http://schemas.openxmlformats.org/drawingml/2006/main" xmlns:r="http://schemas.openxmlformats.org/officeDocument/2006/relationships" xmlns:p="http://schemas.openxmlformats.org/presentationml/2006/main">
+  <p:cSld>
+    <p:spTree>
+      <p:nvGrpSpPr>
+        <p:cNvPr id="1" name=""/>
+        <p:cNvGrpSpPr/>
+        <p:nvPr/>
+      </p:nvGrpSpPr>
+      <p:grpSpPr>
+        <a:xfrm>
+          <a:off x="0" y="0"/>
+          <a:ext cx="0" cy="0"/>
+          <a:chOff x="0" y="0"/>
+          <a:chExt cx="0" cy="0"/>
+        </a:xfrm>
+      </p:grpSpPr>
+      <p:pic>
+        <p:nvPicPr>
+          <p:cNvPr id="17" name="Picture 16">
+            <a:extLst>
+              <a:ext uri="{FF2B5EF4-FFF2-40B4-BE49-F238E27FC236}">
+                <a16:creationId xmlns:a16="http://schemas.microsoft.com/office/drawing/2014/main" id="{04191FB2-6EE6-FE29-D7FC-F5197800BCEC}"/>
+              </a:ext>
+            </a:extLst>
+          </p:cNvPr>
+          <p:cNvPicPr>
+            <a:picLocks noChangeAspect="1"/>
+          </p:cNvPicPr>
+          <p:nvPr/>
+        </p:nvPicPr>
+        <p:blipFill>
+          <a:blip r:embed="rId2">
+            <a:extLst>
+              <a:ext uri="{28A0092B-C50C-407E-A947-70E740481C1C}">
+                <a14:useLocalDpi xmlns:a14="http://schemas.microsoft.com/office/drawing/2010/main" val="0"/>
+              </a:ext>
+            </a:extLst>
+          </a:blip>
+          <a:srcRect/>
+          <a:stretch/>
+        </p:blipFill>
+        <p:spPr>
+          <a:xfrm>
+            <a:off x="758236" y="907129"/>
+            <a:ext cx="3048753" cy="2097338"/>
+          </a:xfrm>
+          <a:prstGeom prst="rect">
+            <a:avLst/>
+          </a:prstGeom>
+        </p:spPr>
+      </p:pic>
+      <p:pic>
+        <p:nvPicPr>
+          <p:cNvPr id="4" name="Picture 3">
+            <a:extLst>
+              <a:ext uri="{FF2B5EF4-FFF2-40B4-BE49-F238E27FC236}">
+                <a16:creationId xmlns:a16="http://schemas.microsoft.com/office/drawing/2014/main" id="{E48FBA19-BB38-C129-032E-58E7643DB8D6}"/>
+              </a:ext>
+            </a:extLst>
+          </p:cNvPr>
+          <p:cNvPicPr>
+            <a:picLocks noChangeAspect="1"/>
+          </p:cNvPicPr>
+          <p:nvPr/>
+        </p:nvPicPr>
+        <p:blipFill>
+          <a:blip r:embed="rId3">
+            <a:extLst>
+              <a:ext uri="{28A0092B-C50C-407E-A947-70E740481C1C}">
+                <a14:useLocalDpi xmlns:a14="http://schemas.microsoft.com/office/drawing/2010/main" val="0"/>
+              </a:ext>
+            </a:extLst>
+          </a:blip>
+          <a:srcRect/>
+          <a:stretch/>
+        </p:blipFill>
+        <p:spPr>
+          <a:xfrm>
+            <a:off x="4360063" y="758305"/>
+            <a:ext cx="3510396" cy="2394987"/>
+          </a:xfrm>
+          <a:prstGeom prst="rect">
+            <a:avLst/>
+          </a:prstGeom>
+        </p:spPr>
+      </p:pic>
+      <p:pic>
+        <p:nvPicPr>
+          <p:cNvPr id="12" name="Picture 11">
+            <a:extLst>
+              <a:ext uri="{FF2B5EF4-FFF2-40B4-BE49-F238E27FC236}">
+                <a16:creationId xmlns:a16="http://schemas.microsoft.com/office/drawing/2014/main" id="{E50F2872-0D39-44C6-795A-F41634BBD80E}"/>
+              </a:ext>
+            </a:extLst>
+          </p:cNvPr>
+          <p:cNvPicPr>
+            <a:picLocks noChangeAspect="1"/>
+          </p:cNvPicPr>
+          <p:nvPr/>
+        </p:nvPicPr>
+        <p:blipFill>
+          <a:blip r:embed="rId4">
+            <a:extLst>
+              <a:ext uri="{28A0092B-C50C-407E-A947-70E740481C1C}">
+                <a14:useLocalDpi xmlns:a14="http://schemas.microsoft.com/office/drawing/2010/main" val="0"/>
+              </a:ext>
+            </a:extLst>
+          </a:blip>
+          <a:srcRect/>
+          <a:stretch/>
+        </p:blipFill>
+        <p:spPr>
+          <a:xfrm>
+            <a:off x="8397110" y="919450"/>
+            <a:ext cx="3063074" cy="2072694"/>
+          </a:xfrm>
+          <a:prstGeom prst="rect">
+            <a:avLst/>
+          </a:prstGeom>
+        </p:spPr>
+      </p:pic>
+      <p:pic>
+        <p:nvPicPr>
+          <p:cNvPr id="6" name="Picture 5">
+            <a:extLst>
+              <a:ext uri="{FF2B5EF4-FFF2-40B4-BE49-F238E27FC236}">
+                <a16:creationId xmlns:a16="http://schemas.microsoft.com/office/drawing/2014/main" id="{CF029A79-B2A5-B795-E595-F752D39BCAB9}"/>
+              </a:ext>
+            </a:extLst>
+          </p:cNvPr>
+          <p:cNvPicPr>
+            <a:picLocks noChangeAspect="1"/>
+          </p:cNvPicPr>
+          <p:nvPr/>
+        </p:nvPicPr>
+        <p:blipFill>
+          <a:blip r:embed="rId5">
+            <a:extLst>
+              <a:ext uri="{28A0092B-C50C-407E-A947-70E740481C1C}">
+                <a14:useLocalDpi xmlns:a14="http://schemas.microsoft.com/office/drawing/2010/main" val="0"/>
+              </a:ext>
+            </a:extLst>
+          </a:blip>
+          <a:srcRect/>
+          <a:stretch/>
+        </p:blipFill>
+        <p:spPr>
+          <a:xfrm>
+            <a:off x="745550" y="3853526"/>
+            <a:ext cx="3074124" cy="2097339"/>
+          </a:xfrm>
+          <a:prstGeom prst="rect">
+            <a:avLst/>
+          </a:prstGeom>
+        </p:spPr>
+      </p:pic>
+      <p:pic>
+        <p:nvPicPr>
+          <p:cNvPr id="10" name="Picture 9">
+            <a:extLst>
+              <a:ext uri="{FF2B5EF4-FFF2-40B4-BE49-F238E27FC236}">
+                <a16:creationId xmlns:a16="http://schemas.microsoft.com/office/drawing/2014/main" id="{FF6A95A3-13E3-3989-B296-F4935EF3880E}"/>
+              </a:ext>
+            </a:extLst>
+          </p:cNvPr>
+          <p:cNvPicPr>
+            <a:picLocks noChangeAspect="1"/>
+          </p:cNvPicPr>
+          <p:nvPr/>
+        </p:nvPicPr>
+        <p:blipFill>
+          <a:blip r:embed="rId6">
+            <a:extLst>
+              <a:ext uri="{28A0092B-C50C-407E-A947-70E740481C1C}">
+                <a14:useLocalDpi xmlns:a14="http://schemas.microsoft.com/office/drawing/2010/main" val="0"/>
+              </a:ext>
+            </a:extLst>
+          </a:blip>
+          <a:srcRect/>
+          <a:stretch/>
+        </p:blipFill>
+        <p:spPr>
+          <a:xfrm>
+            <a:off x="4360064" y="3714367"/>
+            <a:ext cx="3510396" cy="2394987"/>
+          </a:xfrm>
+          <a:prstGeom prst="rect">
+            <a:avLst/>
+          </a:prstGeom>
+        </p:spPr>
+      </p:pic>
+      <p:pic>
+        <p:nvPicPr>
+          <p:cNvPr id="8" name="Picture 7">
+            <a:extLst>
+              <a:ext uri="{FF2B5EF4-FFF2-40B4-BE49-F238E27FC236}">
+                <a16:creationId xmlns:a16="http://schemas.microsoft.com/office/drawing/2014/main" id="{63F08613-73E0-CFEA-5FCA-F43D3FC714EB}"/>
+              </a:ext>
+            </a:extLst>
+          </p:cNvPr>
+          <p:cNvPicPr>
+            <a:picLocks noChangeAspect="1"/>
+          </p:cNvPicPr>
+          <p:nvPr/>
+        </p:nvPicPr>
+        <p:blipFill>
+          <a:blip r:embed="rId7">
+            <a:extLst>
+              <a:ext uri="{28A0092B-C50C-407E-A947-70E740481C1C}">
+                <a14:useLocalDpi xmlns:a14="http://schemas.microsoft.com/office/drawing/2010/main" val="0"/>
+              </a:ext>
+            </a:extLst>
+          </a:blip>
+          <a:srcRect/>
+          <a:stretch/>
+        </p:blipFill>
+        <p:spPr>
+          <a:xfrm>
+            <a:off x="8409648" y="3875512"/>
+            <a:ext cx="3038001" cy="2072694"/>
+          </a:xfrm>
+          <a:prstGeom prst="rect">
+            <a:avLst/>
+          </a:prstGeom>
+        </p:spPr>
+      </p:pic>
+    </p:spTree>
+    <p:extLst>
+      <p:ext uri="{BB962C8B-B14F-4D97-AF65-F5344CB8AC3E}">
+        <p14:creationId xmlns:p14="http://schemas.microsoft.com/office/powerpoint/2010/main" val="1962111222"/>
       </p:ext>
     </p:extLst>
   </p:cSld>
@@ -6720,7 +8112,7 @@
         </p:blipFill>
         <p:spPr>
           <a:xfrm>
-            <a:off x="4370402" y="1636477"/>
+            <a:off x="4370402" y="1636479"/>
             <a:ext cx="3247058" cy="1651847"/>
           </a:xfrm>
           <a:prstGeom prst="rect">
@@ -6860,7 +8252,7 @@
         </p:blipFill>
         <p:spPr>
           <a:xfrm>
-            <a:off x="7741167" y="3310661"/>
+            <a:off x="7741169" y="3310663"/>
             <a:ext cx="3247061" cy="1647337"/>
           </a:xfrm>
           <a:prstGeom prst="rect">
@@ -7198,7 +8590,7 @@
         </p:nvSpPr>
         <p:spPr>
           <a:xfrm>
-            <a:off x="3942307" y="1714416"/>
+            <a:off x="3942309" y="1714416"/>
             <a:ext cx="1314893" cy="535800"/>
           </a:xfrm>
           <a:prstGeom prst="rect">
@@ -7276,7 +8668,7 @@
         </p:nvSpPr>
         <p:spPr>
           <a:xfrm>
-            <a:off x="5770663" y="1372610"/>
+            <a:off x="5770665" y="1372610"/>
             <a:ext cx="1403497" cy="1254642"/>
           </a:xfrm>
           <a:prstGeom prst="flowChartDocument">
@@ -7340,7 +8732,7 @@
         </p:nvSpPr>
         <p:spPr>
           <a:xfrm>
-            <a:off x="5770663" y="474680"/>
+            <a:off x="5770665" y="474680"/>
             <a:ext cx="1403497" cy="535800"/>
           </a:xfrm>
           <a:prstGeom prst="rect">
@@ -7401,7 +8793,7 @@
         </p:nvSpPr>
         <p:spPr>
           <a:xfrm>
-            <a:off x="7705355" y="127435"/>
+            <a:off x="7705357" y="127435"/>
             <a:ext cx="1403497" cy="1254642"/>
           </a:xfrm>
           <a:prstGeom prst="flowChartDocument">
@@ -7817,7 +9209,7 @@
         </p:nvCxnSpPr>
         <p:spPr>
           <a:xfrm>
-            <a:off x="3544470" y="1982316"/>
+            <a:off x="3544472" y="1982316"/>
             <a:ext cx="397837" cy="0"/>
           </a:xfrm>
           <a:prstGeom prst="straightConnector1">
@@ -7863,7 +9255,7 @@
         </p:nvCxnSpPr>
         <p:spPr>
           <a:xfrm>
-            <a:off x="5257200" y="1982316"/>
+            <a:off x="5257202" y="1982318"/>
             <a:ext cx="513463" cy="17615"/>
           </a:xfrm>
           <a:prstGeom prst="straightConnector1">
@@ -7955,7 +9347,7 @@
         </p:nvCxnSpPr>
         <p:spPr>
           <a:xfrm>
-            <a:off x="7174160" y="742580"/>
+            <a:off x="7174162" y="742580"/>
             <a:ext cx="531195" cy="12176"/>
           </a:xfrm>
           <a:prstGeom prst="straightConnector1">
@@ -8001,7 +9393,7 @@
         </p:nvCxnSpPr>
         <p:spPr>
           <a:xfrm rot="5400000">
-            <a:off x="9348705" y="3153992"/>
+            <a:off x="9348707" y="3153992"/>
             <a:ext cx="864003" cy="1156214"/>
           </a:xfrm>
           <a:prstGeom prst="bentConnector3">
@@ -9005,7 +10397,7 @@
         </p:nvCxnSpPr>
         <p:spPr>
           <a:xfrm flipH="1">
-            <a:off x="2837926" y="2526691"/>
+            <a:off x="2837926" y="2526693"/>
             <a:ext cx="4796" cy="557449"/>
           </a:xfrm>
           <a:prstGeom prst="straightConnector1">
@@ -9314,7 +10706,7 @@
         </p:blipFill>
         <p:spPr>
           <a:xfrm>
-            <a:off x="282893" y="364478"/>
+            <a:off x="282894" y="364480"/>
             <a:ext cx="11626213" cy="5896407"/>
           </a:xfrm>
           <a:prstGeom prst="rect">
@@ -9389,7 +10781,7 @@
         </p:nvSpPr>
         <p:spPr>
           <a:xfrm>
-            <a:off x="7477991" y="1685059"/>
+            <a:off x="7477993" y="1685061"/>
             <a:ext cx="665019" cy="405245"/>
           </a:xfrm>
           <a:prstGeom prst="rect">
@@ -9442,7 +10834,7 @@
         </p:nvSpPr>
         <p:spPr>
           <a:xfrm>
-            <a:off x="3711895" y="1711036"/>
+            <a:off x="3711897" y="1711038"/>
             <a:ext cx="665019" cy="405245"/>
           </a:xfrm>
           <a:prstGeom prst="rect">
@@ -9634,7 +11026,7 @@
         </p:nvSpPr>
         <p:spPr>
           <a:xfrm>
-            <a:off x="7477990" y="4312228"/>
+            <a:off x="7477992" y="4312230"/>
             <a:ext cx="665019" cy="405245"/>
           </a:xfrm>
           <a:prstGeom prst="rect">
@@ -9698,7 +11090,7 @@
         </p:nvSpPr>
         <p:spPr>
           <a:xfrm>
-            <a:off x="3711893" y="4312226"/>
+            <a:off x="3711895" y="4312228"/>
             <a:ext cx="665019" cy="405245"/>
           </a:xfrm>
           <a:prstGeom prst="rect">
@@ -9816,6 +11208,704 @@
     <p:extLst>
       <p:ext uri="{BB962C8B-B14F-4D97-AF65-F5344CB8AC3E}">
         <p14:creationId xmlns:p14="http://schemas.microsoft.com/office/powerpoint/2010/main" val="2344808578"/>
+      </p:ext>
+    </p:extLst>
+  </p:cSld>
+  <p:clrMapOvr>
+    <a:masterClrMapping/>
+  </p:clrMapOvr>
+</p:sld>
+</file>
+
+<file path=ppt/slides/slide6.xml><?xml version="1.0" encoding="utf-8"?>
+<p:sld xmlns:a="http://schemas.openxmlformats.org/drawingml/2006/main" xmlns:r="http://schemas.openxmlformats.org/officeDocument/2006/relationships" xmlns:p="http://schemas.openxmlformats.org/presentationml/2006/main">
+  <p:cSld>
+    <p:spTree>
+      <p:nvGrpSpPr>
+        <p:cNvPr id="1" name=""/>
+        <p:cNvGrpSpPr/>
+        <p:nvPr/>
+      </p:nvGrpSpPr>
+      <p:grpSpPr>
+        <a:xfrm>
+          <a:off x="0" y="0"/>
+          <a:ext cx="0" cy="0"/>
+          <a:chOff x="0" y="0"/>
+          <a:chExt cx="0" cy="0"/>
+        </a:xfrm>
+      </p:grpSpPr>
+      <p:pic>
+        <p:nvPicPr>
+          <p:cNvPr id="3" name="Picture 2" descr="A screen shot of a graph&#10;&#10;Description automatically generated">
+            <a:extLst>
+              <a:ext uri="{FF2B5EF4-FFF2-40B4-BE49-F238E27FC236}">
+                <a16:creationId xmlns:a16="http://schemas.microsoft.com/office/drawing/2014/main" id="{F77D915C-4A88-48F6-EB3D-3990812F5C4B}"/>
+              </a:ext>
+            </a:extLst>
+          </p:cNvPr>
+          <p:cNvPicPr>
+            <a:picLocks noChangeAspect="1"/>
+          </p:cNvPicPr>
+          <p:nvPr/>
+        </p:nvPicPr>
+        <p:blipFill>
+          <a:blip r:embed="rId2">
+            <a:extLst>
+              <a:ext uri="{28A0092B-C50C-407E-A947-70E740481C1C}">
+                <a14:useLocalDpi xmlns:a14="http://schemas.microsoft.com/office/drawing/2010/main" val="0"/>
+              </a:ext>
+            </a:extLst>
+          </a:blip>
+          <a:stretch>
+            <a:fillRect/>
+          </a:stretch>
+        </p:blipFill>
+        <p:spPr>
+          <a:xfrm>
+            <a:off x="643467" y="1562612"/>
+            <a:ext cx="5294716" cy="3732774"/>
+          </a:xfrm>
+          <a:prstGeom prst="rect">
+            <a:avLst/>
+          </a:prstGeom>
+        </p:spPr>
+      </p:pic>
+      <p:pic>
+        <p:nvPicPr>
+          <p:cNvPr id="14" name="Picture 13" descr="A graph with red and blue dots&#10;&#10;Description automatically generated">
+            <a:extLst>
+              <a:ext uri="{FF2B5EF4-FFF2-40B4-BE49-F238E27FC236}">
+                <a16:creationId xmlns:a16="http://schemas.microsoft.com/office/drawing/2014/main" id="{F875FC0D-B458-5720-7909-5EE5A5B99C70}"/>
+              </a:ext>
+            </a:extLst>
+          </p:cNvPr>
+          <p:cNvPicPr>
+            <a:picLocks noChangeAspect="1"/>
+          </p:cNvPicPr>
+          <p:nvPr/>
+        </p:nvPicPr>
+        <p:blipFill>
+          <a:blip r:embed="rId3">
+            <a:extLst>
+              <a:ext uri="{28A0092B-C50C-407E-A947-70E740481C1C}">
+                <a14:useLocalDpi xmlns:a14="http://schemas.microsoft.com/office/drawing/2010/main" val="0"/>
+              </a:ext>
+            </a:extLst>
+          </a:blip>
+          <a:stretch>
+            <a:fillRect/>
+          </a:stretch>
+        </p:blipFill>
+        <p:spPr>
+          <a:xfrm>
+            <a:off x="6253819" y="1555995"/>
+            <a:ext cx="5294715" cy="3746010"/>
+          </a:xfrm>
+          <a:prstGeom prst="rect">
+            <a:avLst/>
+          </a:prstGeom>
+        </p:spPr>
+      </p:pic>
+      <p:sp>
+        <p:nvSpPr>
+          <p:cNvPr id="15" name="TextBox 14">
+            <a:extLst>
+              <a:ext uri="{FF2B5EF4-FFF2-40B4-BE49-F238E27FC236}">
+                <a16:creationId xmlns:a16="http://schemas.microsoft.com/office/drawing/2014/main" id="{E84CFC9B-D976-D841-FE37-EC7C8D360B2C}"/>
+              </a:ext>
+            </a:extLst>
+          </p:cNvPr>
+          <p:cNvSpPr txBox="1"/>
+          <p:nvPr/>
+        </p:nvSpPr>
+        <p:spPr>
+          <a:xfrm>
+            <a:off x="1527464" y="1143000"/>
+            <a:ext cx="3740727" cy="369332"/>
+          </a:xfrm>
+          <a:prstGeom prst="rect">
+            <a:avLst/>
+          </a:prstGeom>
+          <a:noFill/>
+        </p:spPr>
+        <p:txBody>
+          <a:bodyPr wrap="square" rtlCol="0">
+            <a:spAutoFit/>
+          </a:bodyPr>
+          <a:lstStyle/>
+          <a:p>
+            <a:pPr algn="ctr"/>
+            <a:r>
+              <a:rPr lang="de-DE" dirty="0"/>
+              <a:t>DistilBERT-FLS</a:t>
+            </a:r>
+            <a:endParaRPr lang="en-GB" dirty="0"/>
+          </a:p>
+        </p:txBody>
+      </p:sp>
+      <p:sp>
+        <p:nvSpPr>
+          <p:cNvPr id="16" name="TextBox 15">
+            <a:extLst>
+              <a:ext uri="{FF2B5EF4-FFF2-40B4-BE49-F238E27FC236}">
+                <a16:creationId xmlns:a16="http://schemas.microsoft.com/office/drawing/2014/main" id="{1216E40F-238A-8967-EBA8-49CA3A5B9CDA}"/>
+              </a:ext>
+            </a:extLst>
+          </p:cNvPr>
+          <p:cNvSpPr txBox="1"/>
+          <p:nvPr/>
+        </p:nvSpPr>
+        <p:spPr>
+          <a:xfrm>
+            <a:off x="7030812" y="1200207"/>
+            <a:ext cx="3740727" cy="369332"/>
+          </a:xfrm>
+          <a:prstGeom prst="rect">
+            <a:avLst/>
+          </a:prstGeom>
+          <a:noFill/>
+        </p:spPr>
+        <p:txBody>
+          <a:bodyPr wrap="square" rtlCol="0">
+            <a:spAutoFit/>
+          </a:bodyPr>
+          <a:lstStyle/>
+          <a:p>
+            <a:pPr algn="ctr"/>
+            <a:r>
+              <a:rPr lang="de-DE" dirty="0"/>
+              <a:t>FinBERT-FLS</a:t>
+            </a:r>
+            <a:endParaRPr lang="en-GB" dirty="0"/>
+          </a:p>
+        </p:txBody>
+      </p:sp>
+    </p:spTree>
+    <p:extLst>
+      <p:ext uri="{BB962C8B-B14F-4D97-AF65-F5344CB8AC3E}">
+        <p14:creationId xmlns:p14="http://schemas.microsoft.com/office/powerpoint/2010/main" val="377405077"/>
+      </p:ext>
+    </p:extLst>
+  </p:cSld>
+  <p:clrMapOvr>
+    <a:masterClrMapping/>
+  </p:clrMapOvr>
+</p:sld>
+</file>
+
+<file path=ppt/slides/slide7.xml><?xml version="1.0" encoding="utf-8"?>
+<p:sld xmlns:a="http://schemas.openxmlformats.org/drawingml/2006/main" xmlns:r="http://schemas.openxmlformats.org/officeDocument/2006/relationships" xmlns:p="http://schemas.openxmlformats.org/presentationml/2006/main">
+  <p:cSld>
+    <p:spTree>
+      <p:nvGrpSpPr>
+        <p:cNvPr id="1" name=""/>
+        <p:cNvGrpSpPr/>
+        <p:nvPr/>
+      </p:nvGrpSpPr>
+      <p:grpSpPr>
+        <a:xfrm>
+          <a:off x="0" y="0"/>
+          <a:ext cx="0" cy="0"/>
+          <a:chOff x="0" y="0"/>
+          <a:chExt cx="0" cy="0"/>
+        </a:xfrm>
+      </p:grpSpPr>
+      <p:pic>
+        <p:nvPicPr>
+          <p:cNvPr id="3" name="Picture 2">
+            <a:extLst>
+              <a:ext uri="{FF2B5EF4-FFF2-40B4-BE49-F238E27FC236}">
+                <a16:creationId xmlns:a16="http://schemas.microsoft.com/office/drawing/2014/main" id="{F77D915C-4A88-48F6-EB3D-3990812F5C4B}"/>
+              </a:ext>
+            </a:extLst>
+          </p:cNvPr>
+          <p:cNvPicPr>
+            <a:picLocks noChangeAspect="1"/>
+          </p:cNvPicPr>
+          <p:nvPr/>
+        </p:nvPicPr>
+        <p:blipFill>
+          <a:blip r:embed="rId2">
+            <a:extLst>
+              <a:ext uri="{28A0092B-C50C-407E-A947-70E740481C1C}">
+                <a14:useLocalDpi xmlns:a14="http://schemas.microsoft.com/office/drawing/2010/main" val="0"/>
+              </a:ext>
+            </a:extLst>
+          </a:blip>
+          <a:srcRect/>
+          <a:stretch/>
+        </p:blipFill>
+        <p:spPr>
+          <a:xfrm>
+            <a:off x="649984" y="1562612"/>
+            <a:ext cx="5281682" cy="3732774"/>
+          </a:xfrm>
+          <a:prstGeom prst="rect">
+            <a:avLst/>
+          </a:prstGeom>
+        </p:spPr>
+      </p:pic>
+      <p:pic>
+        <p:nvPicPr>
+          <p:cNvPr id="14" name="Picture 13">
+            <a:extLst>
+              <a:ext uri="{FF2B5EF4-FFF2-40B4-BE49-F238E27FC236}">
+                <a16:creationId xmlns:a16="http://schemas.microsoft.com/office/drawing/2014/main" id="{F875FC0D-B458-5720-7909-5EE5A5B99C70}"/>
+              </a:ext>
+            </a:extLst>
+          </p:cNvPr>
+          <p:cNvPicPr>
+            <a:picLocks noChangeAspect="1"/>
+          </p:cNvPicPr>
+          <p:nvPr/>
+        </p:nvPicPr>
+        <p:blipFill>
+          <a:blip r:embed="rId3">
+            <a:extLst>
+              <a:ext uri="{28A0092B-C50C-407E-A947-70E740481C1C}">
+                <a14:useLocalDpi xmlns:a14="http://schemas.microsoft.com/office/drawing/2010/main" val="0"/>
+              </a:ext>
+            </a:extLst>
+          </a:blip>
+          <a:srcRect/>
+          <a:stretch/>
+        </p:blipFill>
+        <p:spPr>
+          <a:xfrm>
+            <a:off x="6258156" y="1555995"/>
+            <a:ext cx="5286036" cy="3746010"/>
+          </a:xfrm>
+          <a:prstGeom prst="rect">
+            <a:avLst/>
+          </a:prstGeom>
+        </p:spPr>
+      </p:pic>
+      <p:sp>
+        <p:nvSpPr>
+          <p:cNvPr id="15" name="TextBox 14">
+            <a:extLst>
+              <a:ext uri="{FF2B5EF4-FFF2-40B4-BE49-F238E27FC236}">
+                <a16:creationId xmlns:a16="http://schemas.microsoft.com/office/drawing/2014/main" id="{E84CFC9B-D976-D841-FE37-EC7C8D360B2C}"/>
+              </a:ext>
+            </a:extLst>
+          </p:cNvPr>
+          <p:cNvSpPr txBox="1"/>
+          <p:nvPr/>
+        </p:nvSpPr>
+        <p:spPr>
+          <a:xfrm>
+            <a:off x="1527464" y="1143000"/>
+            <a:ext cx="3740727" cy="369332"/>
+          </a:xfrm>
+          <a:prstGeom prst="rect">
+            <a:avLst/>
+          </a:prstGeom>
+          <a:noFill/>
+        </p:spPr>
+        <p:txBody>
+          <a:bodyPr wrap="square" rtlCol="0">
+            <a:spAutoFit/>
+          </a:bodyPr>
+          <a:lstStyle/>
+          <a:p>
+            <a:pPr algn="ctr"/>
+            <a:r>
+              <a:rPr lang="de-DE" dirty="0"/>
+              <a:t>DistilBERT-FLS</a:t>
+            </a:r>
+            <a:endParaRPr lang="en-GB" dirty="0"/>
+          </a:p>
+        </p:txBody>
+      </p:sp>
+      <p:sp>
+        <p:nvSpPr>
+          <p:cNvPr id="16" name="TextBox 15">
+            <a:extLst>
+              <a:ext uri="{FF2B5EF4-FFF2-40B4-BE49-F238E27FC236}">
+                <a16:creationId xmlns:a16="http://schemas.microsoft.com/office/drawing/2014/main" id="{1216E40F-238A-8967-EBA8-49CA3A5B9CDA}"/>
+              </a:ext>
+            </a:extLst>
+          </p:cNvPr>
+          <p:cNvSpPr txBox="1"/>
+          <p:nvPr/>
+        </p:nvSpPr>
+        <p:spPr>
+          <a:xfrm>
+            <a:off x="7030812" y="1200207"/>
+            <a:ext cx="3740727" cy="369332"/>
+          </a:xfrm>
+          <a:prstGeom prst="rect">
+            <a:avLst/>
+          </a:prstGeom>
+          <a:noFill/>
+        </p:spPr>
+        <p:txBody>
+          <a:bodyPr wrap="square" rtlCol="0">
+            <a:spAutoFit/>
+          </a:bodyPr>
+          <a:lstStyle/>
+          <a:p>
+            <a:pPr algn="ctr"/>
+            <a:r>
+              <a:rPr lang="de-DE" dirty="0"/>
+              <a:t>FinBERT-FLS</a:t>
+            </a:r>
+            <a:endParaRPr lang="en-GB" dirty="0"/>
+          </a:p>
+        </p:txBody>
+      </p:sp>
+    </p:spTree>
+    <p:extLst>
+      <p:ext uri="{BB962C8B-B14F-4D97-AF65-F5344CB8AC3E}">
+        <p14:creationId xmlns:p14="http://schemas.microsoft.com/office/powerpoint/2010/main" val="73550525"/>
+      </p:ext>
+    </p:extLst>
+  </p:cSld>
+  <p:clrMapOvr>
+    <a:masterClrMapping/>
+  </p:clrMapOvr>
+</p:sld>
+</file>
+
+<file path=ppt/slides/slide8.xml><?xml version="1.0" encoding="utf-8"?>
+<p:sld xmlns:a="http://schemas.openxmlformats.org/drawingml/2006/main" xmlns:r="http://schemas.openxmlformats.org/officeDocument/2006/relationships" xmlns:p="http://schemas.openxmlformats.org/presentationml/2006/main">
+  <p:cSld>
+    <p:spTree>
+      <p:nvGrpSpPr>
+        <p:cNvPr id="1" name=""/>
+        <p:cNvGrpSpPr/>
+        <p:nvPr/>
+      </p:nvGrpSpPr>
+      <p:grpSpPr>
+        <a:xfrm>
+          <a:off x="0" y="0"/>
+          <a:ext cx="0" cy="0"/>
+          <a:chOff x="0" y="0"/>
+          <a:chExt cx="0" cy="0"/>
+        </a:xfrm>
+      </p:grpSpPr>
+      <p:pic>
+        <p:nvPicPr>
+          <p:cNvPr id="3" name="Picture 2">
+            <a:extLst>
+              <a:ext uri="{FF2B5EF4-FFF2-40B4-BE49-F238E27FC236}">
+                <a16:creationId xmlns:a16="http://schemas.microsoft.com/office/drawing/2014/main" id="{F77D915C-4A88-48F6-EB3D-3990812F5C4B}"/>
+              </a:ext>
+            </a:extLst>
+          </p:cNvPr>
+          <p:cNvPicPr>
+            <a:picLocks noChangeAspect="1"/>
+          </p:cNvPicPr>
+          <p:nvPr/>
+        </p:nvPicPr>
+        <p:blipFill>
+          <a:blip r:embed="rId2">
+            <a:extLst>
+              <a:ext uri="{28A0092B-C50C-407E-A947-70E740481C1C}">
+                <a14:useLocalDpi xmlns:a14="http://schemas.microsoft.com/office/drawing/2010/main" val="0"/>
+              </a:ext>
+            </a:extLst>
+          </a:blip>
+          <a:srcRect/>
+          <a:stretch/>
+        </p:blipFill>
+        <p:spPr>
+          <a:xfrm>
+            <a:off x="669225" y="1562612"/>
+            <a:ext cx="5243200" cy="3732774"/>
+          </a:xfrm>
+          <a:prstGeom prst="rect">
+            <a:avLst/>
+          </a:prstGeom>
+        </p:spPr>
+      </p:pic>
+      <p:pic>
+        <p:nvPicPr>
+          <p:cNvPr id="14" name="Picture 13">
+            <a:extLst>
+              <a:ext uri="{FF2B5EF4-FFF2-40B4-BE49-F238E27FC236}">
+                <a16:creationId xmlns:a16="http://schemas.microsoft.com/office/drawing/2014/main" id="{F875FC0D-B458-5720-7909-5EE5A5B99C70}"/>
+              </a:ext>
+            </a:extLst>
+          </p:cNvPr>
+          <p:cNvPicPr>
+            <a:picLocks noChangeAspect="1"/>
+          </p:cNvPicPr>
+          <p:nvPr/>
+        </p:nvPicPr>
+        <p:blipFill>
+          <a:blip r:embed="rId3">
+            <a:extLst>
+              <a:ext uri="{28A0092B-C50C-407E-A947-70E740481C1C}">
+                <a14:useLocalDpi xmlns:a14="http://schemas.microsoft.com/office/drawing/2010/main" val="0"/>
+              </a:ext>
+            </a:extLst>
+          </a:blip>
+          <a:srcRect/>
+          <a:stretch/>
+        </p:blipFill>
+        <p:spPr>
+          <a:xfrm>
+            <a:off x="6278967" y="1555995"/>
+            <a:ext cx="5244414" cy="3746010"/>
+          </a:xfrm>
+          <a:prstGeom prst="rect">
+            <a:avLst/>
+          </a:prstGeom>
+        </p:spPr>
+      </p:pic>
+      <p:sp>
+        <p:nvSpPr>
+          <p:cNvPr id="15" name="TextBox 14">
+            <a:extLst>
+              <a:ext uri="{FF2B5EF4-FFF2-40B4-BE49-F238E27FC236}">
+                <a16:creationId xmlns:a16="http://schemas.microsoft.com/office/drawing/2014/main" id="{E84CFC9B-D976-D841-FE37-EC7C8D360B2C}"/>
+              </a:ext>
+            </a:extLst>
+          </p:cNvPr>
+          <p:cNvSpPr txBox="1"/>
+          <p:nvPr/>
+        </p:nvSpPr>
+        <p:spPr>
+          <a:xfrm>
+            <a:off x="1527464" y="1143000"/>
+            <a:ext cx="3740727" cy="369332"/>
+          </a:xfrm>
+          <a:prstGeom prst="rect">
+            <a:avLst/>
+          </a:prstGeom>
+          <a:noFill/>
+        </p:spPr>
+        <p:txBody>
+          <a:bodyPr wrap="square" rtlCol="0">
+            <a:spAutoFit/>
+          </a:bodyPr>
+          <a:lstStyle/>
+          <a:p>
+            <a:pPr algn="ctr"/>
+            <a:r>
+              <a:rPr lang="de-DE" dirty="0"/>
+              <a:t>DistilBERT-FLS</a:t>
+            </a:r>
+            <a:endParaRPr lang="en-GB" dirty="0"/>
+          </a:p>
+        </p:txBody>
+      </p:sp>
+      <p:sp>
+        <p:nvSpPr>
+          <p:cNvPr id="16" name="TextBox 15">
+            <a:extLst>
+              <a:ext uri="{FF2B5EF4-FFF2-40B4-BE49-F238E27FC236}">
+                <a16:creationId xmlns:a16="http://schemas.microsoft.com/office/drawing/2014/main" id="{1216E40F-238A-8967-EBA8-49CA3A5B9CDA}"/>
+              </a:ext>
+            </a:extLst>
+          </p:cNvPr>
+          <p:cNvSpPr txBox="1"/>
+          <p:nvPr/>
+        </p:nvSpPr>
+        <p:spPr>
+          <a:xfrm>
+            <a:off x="7030812" y="1200207"/>
+            <a:ext cx="3740727" cy="369332"/>
+          </a:xfrm>
+          <a:prstGeom prst="rect">
+            <a:avLst/>
+          </a:prstGeom>
+          <a:noFill/>
+        </p:spPr>
+        <p:txBody>
+          <a:bodyPr wrap="square" rtlCol="0">
+            <a:spAutoFit/>
+          </a:bodyPr>
+          <a:lstStyle/>
+          <a:p>
+            <a:pPr algn="ctr"/>
+            <a:r>
+              <a:rPr lang="de-DE" dirty="0"/>
+              <a:t>FinBERT-FLS</a:t>
+            </a:r>
+            <a:endParaRPr lang="en-GB" dirty="0"/>
+          </a:p>
+        </p:txBody>
+      </p:sp>
+    </p:spTree>
+    <p:extLst>
+      <p:ext uri="{BB962C8B-B14F-4D97-AF65-F5344CB8AC3E}">
+        <p14:creationId xmlns:p14="http://schemas.microsoft.com/office/powerpoint/2010/main" val="4096903356"/>
+      </p:ext>
+    </p:extLst>
+  </p:cSld>
+  <p:clrMapOvr>
+    <a:masterClrMapping/>
+  </p:clrMapOvr>
+</p:sld>
+</file>
+
+<file path=ppt/slides/slide9.xml><?xml version="1.0" encoding="utf-8"?>
+<p:sld xmlns:a="http://schemas.openxmlformats.org/drawingml/2006/main" xmlns:r="http://schemas.openxmlformats.org/officeDocument/2006/relationships" xmlns:p="http://schemas.openxmlformats.org/presentationml/2006/main">
+  <p:cSld>
+    <p:spTree>
+      <p:nvGrpSpPr>
+        <p:cNvPr id="1" name=""/>
+        <p:cNvGrpSpPr/>
+        <p:nvPr/>
+      </p:nvGrpSpPr>
+      <p:grpSpPr>
+        <a:xfrm>
+          <a:off x="0" y="0"/>
+          <a:ext cx="0" cy="0"/>
+          <a:chOff x="0" y="0"/>
+          <a:chExt cx="0" cy="0"/>
+        </a:xfrm>
+      </p:grpSpPr>
+      <p:pic>
+        <p:nvPicPr>
+          <p:cNvPr id="3" name="Picture 2">
+            <a:extLst>
+              <a:ext uri="{FF2B5EF4-FFF2-40B4-BE49-F238E27FC236}">
+                <a16:creationId xmlns:a16="http://schemas.microsoft.com/office/drawing/2014/main" id="{F77D915C-4A88-48F6-EB3D-3990812F5C4B}"/>
+              </a:ext>
+            </a:extLst>
+          </p:cNvPr>
+          <p:cNvPicPr>
+            <a:picLocks noChangeAspect="1"/>
+          </p:cNvPicPr>
+          <p:nvPr/>
+        </p:nvPicPr>
+        <p:blipFill>
+          <a:blip r:embed="rId2">
+            <a:extLst>
+              <a:ext uri="{28A0092B-C50C-407E-A947-70E740481C1C}">
+                <a14:useLocalDpi xmlns:a14="http://schemas.microsoft.com/office/drawing/2010/main" val="0"/>
+              </a:ext>
+            </a:extLst>
+          </a:blip>
+          <a:srcRect/>
+          <a:stretch/>
+        </p:blipFill>
+        <p:spPr>
+          <a:xfrm>
+            <a:off x="669225" y="1562612"/>
+            <a:ext cx="5243200" cy="3732773"/>
+          </a:xfrm>
+          <a:prstGeom prst="rect">
+            <a:avLst/>
+          </a:prstGeom>
+        </p:spPr>
+      </p:pic>
+      <p:pic>
+        <p:nvPicPr>
+          <p:cNvPr id="14" name="Picture 13">
+            <a:extLst>
+              <a:ext uri="{FF2B5EF4-FFF2-40B4-BE49-F238E27FC236}">
+                <a16:creationId xmlns:a16="http://schemas.microsoft.com/office/drawing/2014/main" id="{F875FC0D-B458-5720-7909-5EE5A5B99C70}"/>
+              </a:ext>
+            </a:extLst>
+          </p:cNvPr>
+          <p:cNvPicPr>
+            <a:picLocks noChangeAspect="1"/>
+          </p:cNvPicPr>
+          <p:nvPr/>
+        </p:nvPicPr>
+        <p:blipFill>
+          <a:blip r:embed="rId3">
+            <a:extLst>
+              <a:ext uri="{28A0092B-C50C-407E-A947-70E740481C1C}">
+                <a14:useLocalDpi xmlns:a14="http://schemas.microsoft.com/office/drawing/2010/main" val="0"/>
+              </a:ext>
+            </a:extLst>
+          </a:blip>
+          <a:srcRect/>
+          <a:stretch/>
+        </p:blipFill>
+        <p:spPr>
+          <a:xfrm>
+            <a:off x="6278967" y="1555995"/>
+            <a:ext cx="5244414" cy="3746010"/>
+          </a:xfrm>
+          <a:prstGeom prst="rect">
+            <a:avLst/>
+          </a:prstGeom>
+        </p:spPr>
+      </p:pic>
+      <p:sp>
+        <p:nvSpPr>
+          <p:cNvPr id="15" name="TextBox 14">
+            <a:extLst>
+              <a:ext uri="{FF2B5EF4-FFF2-40B4-BE49-F238E27FC236}">
+                <a16:creationId xmlns:a16="http://schemas.microsoft.com/office/drawing/2014/main" id="{E84CFC9B-D976-D841-FE37-EC7C8D360B2C}"/>
+              </a:ext>
+            </a:extLst>
+          </p:cNvPr>
+          <p:cNvSpPr txBox="1"/>
+          <p:nvPr/>
+        </p:nvSpPr>
+        <p:spPr>
+          <a:xfrm>
+            <a:off x="1527464" y="1143000"/>
+            <a:ext cx="3740727" cy="369332"/>
+          </a:xfrm>
+          <a:prstGeom prst="rect">
+            <a:avLst/>
+          </a:prstGeom>
+          <a:noFill/>
+        </p:spPr>
+        <p:txBody>
+          <a:bodyPr wrap="square" rtlCol="0">
+            <a:spAutoFit/>
+          </a:bodyPr>
+          <a:lstStyle/>
+          <a:p>
+            <a:pPr algn="ctr"/>
+            <a:r>
+              <a:rPr lang="de-DE" dirty="0"/>
+              <a:t>DistilBERT-FLS</a:t>
+            </a:r>
+            <a:endParaRPr lang="en-GB" dirty="0"/>
+          </a:p>
+        </p:txBody>
+      </p:sp>
+      <p:sp>
+        <p:nvSpPr>
+          <p:cNvPr id="16" name="TextBox 15">
+            <a:extLst>
+              <a:ext uri="{FF2B5EF4-FFF2-40B4-BE49-F238E27FC236}">
+                <a16:creationId xmlns:a16="http://schemas.microsoft.com/office/drawing/2014/main" id="{1216E40F-238A-8967-EBA8-49CA3A5B9CDA}"/>
+              </a:ext>
+            </a:extLst>
+          </p:cNvPr>
+          <p:cNvSpPr txBox="1"/>
+          <p:nvPr/>
+        </p:nvSpPr>
+        <p:spPr>
+          <a:xfrm>
+            <a:off x="7030812" y="1200207"/>
+            <a:ext cx="3740727" cy="369332"/>
+          </a:xfrm>
+          <a:prstGeom prst="rect">
+            <a:avLst/>
+          </a:prstGeom>
+          <a:noFill/>
+        </p:spPr>
+        <p:txBody>
+          <a:bodyPr wrap="square" rtlCol="0">
+            <a:spAutoFit/>
+          </a:bodyPr>
+          <a:lstStyle/>
+          <a:p>
+            <a:pPr algn="ctr"/>
+            <a:r>
+              <a:rPr lang="de-DE" dirty="0"/>
+              <a:t>FinBERT-FLS</a:t>
+            </a:r>
+            <a:endParaRPr lang="en-GB" dirty="0"/>
+          </a:p>
+        </p:txBody>
+      </p:sp>
+    </p:spTree>
+    <p:extLst>
+      <p:ext uri="{BB962C8B-B14F-4D97-AF65-F5344CB8AC3E}">
+        <p14:creationId xmlns:p14="http://schemas.microsoft.com/office/powerpoint/2010/main" val="3675786211"/>
       </p:ext>
     </p:extLst>
   </p:cSld>

</xml_diff>